<commit_message>
Added pdf version of presentation
</commit_message>
<xml_diff>
--- a/prj/presentation/IAHMAC.pptx
+++ b/prj/presentation/IAHMAC.pptx
@@ -5,7 +5,7 @@
     <p:sldMasterId id="2147483648" r:id="rId1"/>
   </p:sldMasterIdLst>
   <p:notesMasterIdLst>
-    <p:notesMasterId r:id="rId14"/>
+    <p:notesMasterId r:id="rId18"/>
   </p:notesMasterIdLst>
   <p:sldIdLst>
     <p:sldId id="256" r:id="rId2"/>
@@ -17,9 +17,13 @@
     <p:sldId id="263" r:id="rId8"/>
     <p:sldId id="264" r:id="rId9"/>
     <p:sldId id="265" r:id="rId10"/>
-    <p:sldId id="266" r:id="rId11"/>
-    <p:sldId id="267" r:id="rId12"/>
-    <p:sldId id="260" r:id="rId13"/>
+    <p:sldId id="268" r:id="rId11"/>
+    <p:sldId id="269" r:id="rId12"/>
+    <p:sldId id="271" r:id="rId13"/>
+    <p:sldId id="272" r:id="rId14"/>
+    <p:sldId id="273" r:id="rId15"/>
+    <p:sldId id="270" r:id="rId16"/>
+    <p:sldId id="260" r:id="rId17"/>
   </p:sldIdLst>
   <p:sldSz cx="12192000" cy="6858000"/>
   <p:notesSz cx="6858000" cy="9144000"/>
@@ -118,6 +122,11 @@
       </a:defRPr>
     </a:lvl9pPr>
   </p:defaultTextStyle>
+  <p:extLst>
+    <p:ext uri="{EFAFB233-063F-42B5-8137-9DF3F51BA10A}">
+      <p15:sldGuideLst xmlns:p15="http://schemas.microsoft.com/office/powerpoint/2012/main"/>
+    </p:ext>
+  </p:extLst>
 </p:presentation>
 </file>
 
@@ -203,7 +212,7 @@
           <a:p>
             <a:fld id="{EDE0883A-6E87-41FE-A70F-DAF024453022}" type="datetimeFigureOut">
               <a:rPr lang="en-US" smtClean="0"/>
-              <a:t>4/8/2017</a:t>
+              <a:t>4/21/2017</a:t>
             </a:fld>
             <a:endParaRPr lang="en-US"/>
           </a:p>
@@ -298,7 +307,6 @@
               <a:rPr lang="en-US"/>
               <a:t>Fifth level</a:t>
             </a:r>
-            <a:endParaRPr lang="en-US"/>
           </a:p>
         </p:txBody>
       </p:sp>
@@ -563,6 +571,882 @@
 </p:notes>
 </file>
 
+<file path=ppt/notesSlides/notesSlide10.xml><?xml version="1.0" encoding="utf-8"?>
+<p:notes xmlns:a="http://schemas.openxmlformats.org/drawingml/2006/main" xmlns:r="http://schemas.openxmlformats.org/officeDocument/2006/relationships" xmlns:p="http://schemas.openxmlformats.org/presentationml/2006/main">
+  <p:cSld>
+    <p:spTree>
+      <p:nvGrpSpPr>
+        <p:cNvPr id="1" name=""/>
+        <p:cNvGrpSpPr/>
+        <p:nvPr/>
+      </p:nvGrpSpPr>
+      <p:grpSpPr>
+        <a:xfrm>
+          <a:off x="0" y="0"/>
+          <a:ext cx="0" cy="0"/>
+          <a:chOff x="0" y="0"/>
+          <a:chExt cx="0" cy="0"/>
+        </a:xfrm>
+      </p:grpSpPr>
+      <p:sp>
+        <p:nvSpPr>
+          <p:cNvPr id="2" name="Slide Image Placeholder 1"/>
+          <p:cNvSpPr>
+            <a:spLocks noGrp="1" noRot="1" noChangeAspect="1"/>
+          </p:cNvSpPr>
+          <p:nvPr>
+            <p:ph type="sldImg"/>
+          </p:nvPr>
+        </p:nvSpPr>
+        <p:spPr/>
+      </p:sp>
+      <p:sp>
+        <p:nvSpPr>
+          <p:cNvPr id="3" name="Notes Placeholder 2"/>
+          <p:cNvSpPr>
+            <a:spLocks noGrp="1"/>
+          </p:cNvSpPr>
+          <p:nvPr>
+            <p:ph type="body" idx="1"/>
+          </p:nvPr>
+        </p:nvSpPr>
+        <p:spPr/>
+        <p:txBody>
+          <a:bodyPr/>
+          <a:lstStyle/>
+          <a:p>
+            <a:r>
+              <a:rPr lang="en-US" dirty="0"/>
+              <a:t>All credit goes to bouncy</a:t>
+            </a:r>
+            <a:r>
+              <a:rPr lang="en-US" baseline="0" dirty="0"/>
+              <a:t> castle for their SHA 3 algorithm. Didn’t have time to implement by own SHA 3 algorithm. Should check them out, they have all kinds of secure algorithms you can use such as AES, </a:t>
+            </a:r>
+            <a:r>
+              <a:rPr lang="en-US" baseline="0" dirty="0" err="1"/>
+              <a:t>bcrypt</a:t>
+            </a:r>
+            <a:r>
+              <a:rPr lang="en-US" baseline="0" dirty="0"/>
+              <a:t>, and RSA.</a:t>
+            </a:r>
+          </a:p>
+          <a:p>
+            <a:r>
+              <a:rPr lang="en-US" baseline="0" dirty="0"/>
+              <a:t>Pictures on left is what the sender is doing. picture on right is what receiver does</a:t>
+            </a:r>
+            <a:endParaRPr lang="en-US" dirty="0"/>
+          </a:p>
+        </p:txBody>
+      </p:sp>
+      <p:sp>
+        <p:nvSpPr>
+          <p:cNvPr id="4" name="Slide Number Placeholder 3"/>
+          <p:cNvSpPr>
+            <a:spLocks noGrp="1"/>
+          </p:cNvSpPr>
+          <p:nvPr>
+            <p:ph type="sldNum" sz="quarter" idx="10"/>
+          </p:nvPr>
+        </p:nvSpPr>
+        <p:spPr/>
+        <p:txBody>
+          <a:bodyPr/>
+          <a:lstStyle/>
+          <a:p>
+            <a:fld id="{575B6190-1221-4E33-9DD3-5A103E142EBE}" type="slidenum">
+              <a:rPr lang="en-US" smtClean="0"/>
+              <a:t>14</a:t>
+            </a:fld>
+            <a:endParaRPr lang="en-US"/>
+          </a:p>
+        </p:txBody>
+      </p:sp>
+    </p:spTree>
+    <p:extLst>
+      <p:ext uri="{BB962C8B-B14F-4D97-AF65-F5344CB8AC3E}">
+        <p14:creationId xmlns:p14="http://schemas.microsoft.com/office/powerpoint/2010/main" val="3431824450"/>
+      </p:ext>
+    </p:extLst>
+  </p:cSld>
+  <p:clrMapOvr>
+    <a:masterClrMapping/>
+  </p:clrMapOvr>
+</p:notes>
+</file>
+
+<file path=ppt/notesSlides/notesSlide2.xml><?xml version="1.0" encoding="utf-8"?>
+<p:notes xmlns:a="http://schemas.openxmlformats.org/drawingml/2006/main" xmlns:r="http://schemas.openxmlformats.org/officeDocument/2006/relationships" xmlns:p="http://schemas.openxmlformats.org/presentationml/2006/main">
+  <p:cSld>
+    <p:spTree>
+      <p:nvGrpSpPr>
+        <p:cNvPr id="1" name=""/>
+        <p:cNvGrpSpPr/>
+        <p:nvPr/>
+      </p:nvGrpSpPr>
+      <p:grpSpPr>
+        <a:xfrm>
+          <a:off x="0" y="0"/>
+          <a:ext cx="0" cy="0"/>
+          <a:chOff x="0" y="0"/>
+          <a:chExt cx="0" cy="0"/>
+        </a:xfrm>
+      </p:grpSpPr>
+      <p:sp>
+        <p:nvSpPr>
+          <p:cNvPr id="2" name="Slide Image Placeholder 1"/>
+          <p:cNvSpPr>
+            <a:spLocks noGrp="1" noRot="1" noChangeAspect="1"/>
+          </p:cNvSpPr>
+          <p:nvPr>
+            <p:ph type="sldImg"/>
+          </p:nvPr>
+        </p:nvSpPr>
+        <p:spPr/>
+      </p:sp>
+      <p:sp>
+        <p:nvSpPr>
+          <p:cNvPr id="3" name="Notes Placeholder 2"/>
+          <p:cNvSpPr>
+            <a:spLocks noGrp="1"/>
+          </p:cNvSpPr>
+          <p:nvPr>
+            <p:ph type="body" idx="1"/>
+          </p:nvPr>
+        </p:nvSpPr>
+        <p:spPr/>
+        <p:txBody>
+          <a:bodyPr/>
+          <a:lstStyle/>
+          <a:p>
+            <a:r>
+              <a:rPr lang="en-US" dirty="0"/>
+              <a:t>Sort of like symmetric encryption but</a:t>
+            </a:r>
+            <a:r>
+              <a:rPr lang="en-US" baseline="0" dirty="0"/>
+              <a:t> not encrypting anything. Absolute base form of </a:t>
+            </a:r>
+            <a:r>
+              <a:rPr lang="en-US" baseline="0" dirty="0" err="1"/>
+              <a:t>hmac</a:t>
+            </a:r>
+            <a:r>
+              <a:rPr lang="en-US" baseline="0" dirty="0"/>
+              <a:t>, as basic as it gets</a:t>
+            </a:r>
+            <a:endParaRPr lang="en-US" dirty="0"/>
+          </a:p>
+        </p:txBody>
+      </p:sp>
+      <p:sp>
+        <p:nvSpPr>
+          <p:cNvPr id="4" name="Slide Number Placeholder 3"/>
+          <p:cNvSpPr>
+            <a:spLocks noGrp="1"/>
+          </p:cNvSpPr>
+          <p:nvPr>
+            <p:ph type="sldNum" sz="quarter" idx="10"/>
+          </p:nvPr>
+        </p:nvSpPr>
+        <p:spPr/>
+        <p:txBody>
+          <a:bodyPr/>
+          <a:lstStyle/>
+          <a:p>
+            <a:fld id="{575B6190-1221-4E33-9DD3-5A103E142EBE}" type="slidenum">
+              <a:rPr lang="en-US" smtClean="0"/>
+              <a:t>4</a:t>
+            </a:fld>
+            <a:endParaRPr lang="en-US"/>
+          </a:p>
+        </p:txBody>
+      </p:sp>
+    </p:spTree>
+    <p:extLst>
+      <p:ext uri="{BB962C8B-B14F-4D97-AF65-F5344CB8AC3E}">
+        <p14:creationId xmlns:p14="http://schemas.microsoft.com/office/powerpoint/2010/main" val="1398963031"/>
+      </p:ext>
+    </p:extLst>
+  </p:cSld>
+  <p:clrMapOvr>
+    <a:masterClrMapping/>
+  </p:clrMapOvr>
+</p:notes>
+</file>
+
+<file path=ppt/notesSlides/notesSlide3.xml><?xml version="1.0" encoding="utf-8"?>
+<p:notes xmlns:a="http://schemas.openxmlformats.org/drawingml/2006/main" xmlns:r="http://schemas.openxmlformats.org/officeDocument/2006/relationships" xmlns:p="http://schemas.openxmlformats.org/presentationml/2006/main">
+  <p:cSld>
+    <p:spTree>
+      <p:nvGrpSpPr>
+        <p:cNvPr id="1" name=""/>
+        <p:cNvGrpSpPr/>
+        <p:nvPr/>
+      </p:nvGrpSpPr>
+      <p:grpSpPr>
+        <a:xfrm>
+          <a:off x="0" y="0"/>
+          <a:ext cx="0" cy="0"/>
+          <a:chOff x="0" y="0"/>
+          <a:chExt cx="0" cy="0"/>
+        </a:xfrm>
+      </p:grpSpPr>
+      <p:sp>
+        <p:nvSpPr>
+          <p:cNvPr id="2" name="Slide Image Placeholder 1"/>
+          <p:cNvSpPr>
+            <a:spLocks noGrp="1" noRot="1" noChangeAspect="1"/>
+          </p:cNvSpPr>
+          <p:nvPr>
+            <p:ph type="sldImg"/>
+          </p:nvPr>
+        </p:nvSpPr>
+        <p:spPr/>
+      </p:sp>
+      <p:sp>
+        <p:nvSpPr>
+          <p:cNvPr id="3" name="Notes Placeholder 2"/>
+          <p:cNvSpPr>
+            <a:spLocks noGrp="1"/>
+          </p:cNvSpPr>
+          <p:nvPr>
+            <p:ph type="body" idx="1"/>
+          </p:nvPr>
+        </p:nvSpPr>
+        <p:spPr/>
+        <p:txBody>
+          <a:bodyPr/>
+          <a:lstStyle/>
+          <a:p>
+            <a:r>
+              <a:rPr lang="en-US" dirty="0"/>
+              <a:t>Providing authentication through the use of the key</a:t>
+            </a:r>
+          </a:p>
+        </p:txBody>
+      </p:sp>
+      <p:sp>
+        <p:nvSpPr>
+          <p:cNvPr id="4" name="Slide Number Placeholder 3"/>
+          <p:cNvSpPr>
+            <a:spLocks noGrp="1"/>
+          </p:cNvSpPr>
+          <p:nvPr>
+            <p:ph type="sldNum" sz="quarter" idx="10"/>
+          </p:nvPr>
+        </p:nvSpPr>
+        <p:spPr/>
+        <p:txBody>
+          <a:bodyPr/>
+          <a:lstStyle/>
+          <a:p>
+            <a:fld id="{575B6190-1221-4E33-9DD3-5A103E142EBE}" type="slidenum">
+              <a:rPr lang="en-US" smtClean="0"/>
+              <a:t>5</a:t>
+            </a:fld>
+            <a:endParaRPr lang="en-US"/>
+          </a:p>
+        </p:txBody>
+      </p:sp>
+    </p:spTree>
+    <p:extLst>
+      <p:ext uri="{BB962C8B-B14F-4D97-AF65-F5344CB8AC3E}">
+        <p14:creationId xmlns:p14="http://schemas.microsoft.com/office/powerpoint/2010/main" val="3286859249"/>
+      </p:ext>
+    </p:extLst>
+  </p:cSld>
+  <p:clrMapOvr>
+    <a:masterClrMapping/>
+  </p:clrMapOvr>
+</p:notes>
+</file>
+
+<file path=ppt/notesSlides/notesSlide4.xml><?xml version="1.0" encoding="utf-8"?>
+<p:notes xmlns:a="http://schemas.openxmlformats.org/drawingml/2006/main" xmlns:r="http://schemas.openxmlformats.org/officeDocument/2006/relationships" xmlns:p="http://schemas.openxmlformats.org/presentationml/2006/main">
+  <p:cSld>
+    <p:spTree>
+      <p:nvGrpSpPr>
+        <p:cNvPr id="1" name=""/>
+        <p:cNvGrpSpPr/>
+        <p:nvPr/>
+      </p:nvGrpSpPr>
+      <p:grpSpPr>
+        <a:xfrm>
+          <a:off x="0" y="0"/>
+          <a:ext cx="0" cy="0"/>
+          <a:chOff x="0" y="0"/>
+          <a:chExt cx="0" cy="0"/>
+        </a:xfrm>
+      </p:grpSpPr>
+      <p:sp>
+        <p:nvSpPr>
+          <p:cNvPr id="2" name="Slide Image Placeholder 1"/>
+          <p:cNvSpPr>
+            <a:spLocks noGrp="1" noRot="1" noChangeAspect="1"/>
+          </p:cNvSpPr>
+          <p:nvPr>
+            <p:ph type="sldImg"/>
+          </p:nvPr>
+        </p:nvSpPr>
+        <p:spPr/>
+      </p:sp>
+      <p:sp>
+        <p:nvSpPr>
+          <p:cNvPr id="3" name="Notes Placeholder 2"/>
+          <p:cNvSpPr>
+            <a:spLocks noGrp="1"/>
+          </p:cNvSpPr>
+          <p:nvPr>
+            <p:ph type="body" idx="1"/>
+          </p:nvPr>
+        </p:nvSpPr>
+        <p:spPr/>
+        <p:txBody>
+          <a:bodyPr/>
+          <a:lstStyle/>
+          <a:p>
+            <a:r>
+              <a:rPr lang="en-US" dirty="0" err="1"/>
+              <a:t>Hmac</a:t>
+            </a:r>
+            <a:r>
+              <a:rPr lang="en-US" dirty="0"/>
+              <a:t> is hash digest</a:t>
+            </a:r>
+            <a:r>
+              <a:rPr lang="en-US" baseline="0" dirty="0"/>
+              <a:t> using SHA-3 256. Probably don’t want the HMAC in the message in a practical setting, but it’s nice to show when demonstrating</a:t>
+            </a:r>
+            <a:endParaRPr lang="en-US" dirty="0"/>
+          </a:p>
+        </p:txBody>
+      </p:sp>
+      <p:sp>
+        <p:nvSpPr>
+          <p:cNvPr id="4" name="Slide Number Placeholder 3"/>
+          <p:cNvSpPr>
+            <a:spLocks noGrp="1"/>
+          </p:cNvSpPr>
+          <p:nvPr>
+            <p:ph type="sldNum" sz="quarter" idx="10"/>
+          </p:nvPr>
+        </p:nvSpPr>
+        <p:spPr/>
+        <p:txBody>
+          <a:bodyPr/>
+          <a:lstStyle/>
+          <a:p>
+            <a:fld id="{575B6190-1221-4E33-9DD3-5A103E142EBE}" type="slidenum">
+              <a:rPr lang="en-US" smtClean="0"/>
+              <a:t>6</a:t>
+            </a:fld>
+            <a:endParaRPr lang="en-US"/>
+          </a:p>
+        </p:txBody>
+      </p:sp>
+    </p:spTree>
+    <p:extLst>
+      <p:ext uri="{BB962C8B-B14F-4D97-AF65-F5344CB8AC3E}">
+        <p14:creationId xmlns:p14="http://schemas.microsoft.com/office/powerpoint/2010/main" val="2568812523"/>
+      </p:ext>
+    </p:extLst>
+  </p:cSld>
+  <p:clrMapOvr>
+    <a:masterClrMapping/>
+  </p:clrMapOvr>
+</p:notes>
+</file>
+
+<file path=ppt/notesSlides/notesSlide5.xml><?xml version="1.0" encoding="utf-8"?>
+<p:notes xmlns:a="http://schemas.openxmlformats.org/drawingml/2006/main" xmlns:r="http://schemas.openxmlformats.org/officeDocument/2006/relationships" xmlns:p="http://schemas.openxmlformats.org/presentationml/2006/main">
+  <p:cSld>
+    <p:spTree>
+      <p:nvGrpSpPr>
+        <p:cNvPr id="1" name=""/>
+        <p:cNvGrpSpPr/>
+        <p:nvPr/>
+      </p:nvGrpSpPr>
+      <p:grpSpPr>
+        <a:xfrm>
+          <a:off x="0" y="0"/>
+          <a:ext cx="0" cy="0"/>
+          <a:chOff x="0" y="0"/>
+          <a:chExt cx="0" cy="0"/>
+        </a:xfrm>
+      </p:grpSpPr>
+      <p:sp>
+        <p:nvSpPr>
+          <p:cNvPr id="2" name="Slide Image Placeholder 1"/>
+          <p:cNvSpPr>
+            <a:spLocks noGrp="1" noRot="1" noChangeAspect="1"/>
+          </p:cNvSpPr>
+          <p:nvPr>
+            <p:ph type="sldImg"/>
+          </p:nvPr>
+        </p:nvSpPr>
+        <p:spPr/>
+      </p:sp>
+      <p:sp>
+        <p:nvSpPr>
+          <p:cNvPr id="3" name="Notes Placeholder 2"/>
+          <p:cNvSpPr>
+            <a:spLocks noGrp="1"/>
+          </p:cNvSpPr>
+          <p:nvPr>
+            <p:ph type="body" idx="1"/>
+          </p:nvPr>
+        </p:nvSpPr>
+        <p:spPr/>
+        <p:txBody>
+          <a:bodyPr/>
+          <a:lstStyle/>
+          <a:p>
+            <a:r>
+              <a:rPr lang="en-US" dirty="0"/>
+              <a:t>To inbox view. Can click on the message and it will show another toast. That’s what we want to see</a:t>
+            </a:r>
+          </a:p>
+        </p:txBody>
+      </p:sp>
+      <p:sp>
+        <p:nvSpPr>
+          <p:cNvPr id="4" name="Slide Number Placeholder 3"/>
+          <p:cNvSpPr>
+            <a:spLocks noGrp="1"/>
+          </p:cNvSpPr>
+          <p:nvPr>
+            <p:ph type="sldNum" sz="quarter" idx="10"/>
+          </p:nvPr>
+        </p:nvSpPr>
+        <p:spPr/>
+        <p:txBody>
+          <a:bodyPr/>
+          <a:lstStyle/>
+          <a:p>
+            <a:fld id="{575B6190-1221-4E33-9DD3-5A103E142EBE}" type="slidenum">
+              <a:rPr lang="en-US" smtClean="0"/>
+              <a:t>7</a:t>
+            </a:fld>
+            <a:endParaRPr lang="en-US"/>
+          </a:p>
+        </p:txBody>
+      </p:sp>
+    </p:spTree>
+    <p:extLst>
+      <p:ext uri="{BB962C8B-B14F-4D97-AF65-F5344CB8AC3E}">
+        <p14:creationId xmlns:p14="http://schemas.microsoft.com/office/powerpoint/2010/main" val="1013237678"/>
+      </p:ext>
+    </p:extLst>
+  </p:cSld>
+  <p:clrMapOvr>
+    <a:masterClrMapping/>
+  </p:clrMapOvr>
+</p:notes>
+</file>
+
+<file path=ppt/notesSlides/notesSlide6.xml><?xml version="1.0" encoding="utf-8"?>
+<p:notes xmlns:a="http://schemas.openxmlformats.org/drawingml/2006/main" xmlns:r="http://schemas.openxmlformats.org/officeDocument/2006/relationships" xmlns:p="http://schemas.openxmlformats.org/presentationml/2006/main">
+  <p:cSld>
+    <p:spTree>
+      <p:nvGrpSpPr>
+        <p:cNvPr id="1" name=""/>
+        <p:cNvGrpSpPr/>
+        <p:nvPr/>
+      </p:nvGrpSpPr>
+      <p:grpSpPr>
+        <a:xfrm>
+          <a:off x="0" y="0"/>
+          <a:ext cx="0" cy="0"/>
+          <a:chOff x="0" y="0"/>
+          <a:chExt cx="0" cy="0"/>
+        </a:xfrm>
+      </p:grpSpPr>
+      <p:sp>
+        <p:nvSpPr>
+          <p:cNvPr id="2" name="Slide Image Placeholder 1"/>
+          <p:cNvSpPr>
+            <a:spLocks noGrp="1" noRot="1" noChangeAspect="1"/>
+          </p:cNvSpPr>
+          <p:nvPr>
+            <p:ph type="sldImg"/>
+          </p:nvPr>
+        </p:nvSpPr>
+        <p:spPr/>
+      </p:sp>
+      <p:sp>
+        <p:nvSpPr>
+          <p:cNvPr id="3" name="Notes Placeholder 2"/>
+          <p:cNvSpPr>
+            <a:spLocks noGrp="1"/>
+          </p:cNvSpPr>
+          <p:nvPr>
+            <p:ph type="body" idx="1"/>
+          </p:nvPr>
+        </p:nvSpPr>
+        <p:spPr/>
+        <p:txBody>
+          <a:bodyPr/>
+          <a:lstStyle/>
+          <a:p>
+            <a:r>
+              <a:rPr lang="en-US" dirty="0"/>
+              <a:t>Same </a:t>
+            </a:r>
+            <a:r>
+              <a:rPr lang="en-US" dirty="0" err="1"/>
+              <a:t>hmac</a:t>
+            </a:r>
+            <a:r>
+              <a:rPr lang="en-US" dirty="0"/>
+              <a:t> for both messages, but that top</a:t>
+            </a:r>
+            <a:r>
+              <a:rPr lang="en-US" baseline="0" dirty="0"/>
+              <a:t> one is not verified because the key is different. First message is 2</a:t>
+            </a:r>
+            <a:r>
+              <a:rPr lang="en-US" baseline="30000" dirty="0"/>
+              <a:t>nd</a:t>
+            </a:r>
+            <a:r>
+              <a:rPr lang="en-US" baseline="0" dirty="0"/>
+              <a:t> one down Doesn’t match receivers </a:t>
+            </a:r>
+            <a:r>
+              <a:rPr lang="en-US" baseline="0" dirty="0" err="1"/>
+              <a:t>hmac</a:t>
+            </a:r>
+            <a:r>
+              <a:rPr lang="en-US" baseline="0" dirty="0"/>
+              <a:t> because keys are different</a:t>
+            </a:r>
+            <a:endParaRPr lang="en-US" dirty="0"/>
+          </a:p>
+        </p:txBody>
+      </p:sp>
+      <p:sp>
+        <p:nvSpPr>
+          <p:cNvPr id="4" name="Slide Number Placeholder 3"/>
+          <p:cNvSpPr>
+            <a:spLocks noGrp="1"/>
+          </p:cNvSpPr>
+          <p:nvPr>
+            <p:ph type="sldNum" sz="quarter" idx="10"/>
+          </p:nvPr>
+        </p:nvSpPr>
+        <p:spPr/>
+        <p:txBody>
+          <a:bodyPr/>
+          <a:lstStyle/>
+          <a:p>
+            <a:fld id="{575B6190-1221-4E33-9DD3-5A103E142EBE}" type="slidenum">
+              <a:rPr lang="en-US" smtClean="0"/>
+              <a:t>9</a:t>
+            </a:fld>
+            <a:endParaRPr lang="en-US"/>
+          </a:p>
+        </p:txBody>
+      </p:sp>
+    </p:spTree>
+    <p:extLst>
+      <p:ext uri="{BB962C8B-B14F-4D97-AF65-F5344CB8AC3E}">
+        <p14:creationId xmlns:p14="http://schemas.microsoft.com/office/powerpoint/2010/main" val="1274685804"/>
+      </p:ext>
+    </p:extLst>
+  </p:cSld>
+  <p:clrMapOvr>
+    <a:masterClrMapping/>
+  </p:clrMapOvr>
+</p:notes>
+</file>
+
+<file path=ppt/notesSlides/notesSlide7.xml><?xml version="1.0" encoding="utf-8"?>
+<p:notes xmlns:a="http://schemas.openxmlformats.org/drawingml/2006/main" xmlns:r="http://schemas.openxmlformats.org/officeDocument/2006/relationships" xmlns:p="http://schemas.openxmlformats.org/presentationml/2006/main">
+  <p:cSld>
+    <p:spTree>
+      <p:nvGrpSpPr>
+        <p:cNvPr id="1" name=""/>
+        <p:cNvGrpSpPr/>
+        <p:nvPr/>
+      </p:nvGrpSpPr>
+      <p:grpSpPr>
+        <a:xfrm>
+          <a:off x="0" y="0"/>
+          <a:ext cx="0" cy="0"/>
+          <a:chOff x="0" y="0"/>
+          <a:chExt cx="0" cy="0"/>
+        </a:xfrm>
+      </p:grpSpPr>
+      <p:sp>
+        <p:nvSpPr>
+          <p:cNvPr id="2" name="Slide Image Placeholder 1"/>
+          <p:cNvSpPr>
+            <a:spLocks noGrp="1" noRot="1" noChangeAspect="1"/>
+          </p:cNvSpPr>
+          <p:nvPr>
+            <p:ph type="sldImg"/>
+          </p:nvPr>
+        </p:nvSpPr>
+        <p:spPr/>
+      </p:sp>
+      <p:sp>
+        <p:nvSpPr>
+          <p:cNvPr id="3" name="Notes Placeholder 2"/>
+          <p:cNvSpPr>
+            <a:spLocks noGrp="1"/>
+          </p:cNvSpPr>
+          <p:nvPr>
+            <p:ph type="body" idx="1"/>
+          </p:nvPr>
+        </p:nvSpPr>
+        <p:spPr/>
+        <p:txBody>
+          <a:bodyPr/>
+          <a:lstStyle/>
+          <a:p>
+            <a:r>
+              <a:rPr lang="en-US" dirty="0"/>
+              <a:t>How is this useful?</a:t>
+            </a:r>
+            <a:r>
+              <a:rPr lang="en-US" baseline="0" dirty="0"/>
+              <a:t> What can this prevent? </a:t>
+            </a:r>
+            <a:r>
+              <a:rPr lang="en-US" dirty="0"/>
+              <a:t>Basically a hacker can intercept your messages and either look at them or alter them before the get sent to the original</a:t>
+            </a:r>
+            <a:r>
+              <a:rPr lang="en-US" baseline="0" dirty="0"/>
+              <a:t> receiver</a:t>
+            </a:r>
+            <a:endParaRPr lang="en-US" dirty="0"/>
+          </a:p>
+        </p:txBody>
+      </p:sp>
+      <p:sp>
+        <p:nvSpPr>
+          <p:cNvPr id="4" name="Slide Number Placeholder 3"/>
+          <p:cNvSpPr>
+            <a:spLocks noGrp="1"/>
+          </p:cNvSpPr>
+          <p:nvPr>
+            <p:ph type="sldNum" sz="quarter" idx="10"/>
+          </p:nvPr>
+        </p:nvSpPr>
+        <p:spPr/>
+        <p:txBody>
+          <a:bodyPr/>
+          <a:lstStyle/>
+          <a:p>
+            <a:fld id="{575B6190-1221-4E33-9DD3-5A103E142EBE}" type="slidenum">
+              <a:rPr lang="en-US" smtClean="0"/>
+              <a:t>10</a:t>
+            </a:fld>
+            <a:endParaRPr lang="en-US"/>
+          </a:p>
+        </p:txBody>
+      </p:sp>
+    </p:spTree>
+    <p:extLst>
+      <p:ext uri="{BB962C8B-B14F-4D97-AF65-F5344CB8AC3E}">
+        <p14:creationId xmlns:p14="http://schemas.microsoft.com/office/powerpoint/2010/main" val="2623641434"/>
+      </p:ext>
+    </p:extLst>
+  </p:cSld>
+  <p:clrMapOvr>
+    <a:masterClrMapping/>
+  </p:clrMapOvr>
+</p:notes>
+</file>
+
+<file path=ppt/notesSlides/notesSlide8.xml><?xml version="1.0" encoding="utf-8"?>
+<p:notes xmlns:a="http://schemas.openxmlformats.org/drawingml/2006/main" xmlns:r="http://schemas.openxmlformats.org/officeDocument/2006/relationships" xmlns:p="http://schemas.openxmlformats.org/presentationml/2006/main">
+  <p:cSld>
+    <p:spTree>
+      <p:nvGrpSpPr>
+        <p:cNvPr id="1" name=""/>
+        <p:cNvGrpSpPr/>
+        <p:nvPr/>
+      </p:nvGrpSpPr>
+      <p:grpSpPr>
+        <a:xfrm>
+          <a:off x="0" y="0"/>
+          <a:ext cx="0" cy="0"/>
+          <a:chOff x="0" y="0"/>
+          <a:chExt cx="0" cy="0"/>
+        </a:xfrm>
+      </p:grpSpPr>
+      <p:sp>
+        <p:nvSpPr>
+          <p:cNvPr id="2" name="Slide Image Placeholder 1"/>
+          <p:cNvSpPr>
+            <a:spLocks noGrp="1" noRot="1" noChangeAspect="1"/>
+          </p:cNvSpPr>
+          <p:nvPr>
+            <p:ph type="sldImg"/>
+          </p:nvPr>
+        </p:nvSpPr>
+        <p:spPr/>
+      </p:sp>
+      <p:sp>
+        <p:nvSpPr>
+          <p:cNvPr id="3" name="Notes Placeholder 2"/>
+          <p:cNvSpPr>
+            <a:spLocks noGrp="1"/>
+          </p:cNvSpPr>
+          <p:nvPr>
+            <p:ph type="body" idx="1"/>
+          </p:nvPr>
+        </p:nvSpPr>
+        <p:spPr/>
+        <p:txBody>
+          <a:bodyPr/>
+          <a:lstStyle/>
+          <a:p>
+            <a:r>
+              <a:rPr lang="en-US" dirty="0"/>
+              <a:t>Could only get 2</a:t>
+            </a:r>
+            <a:r>
+              <a:rPr lang="en-US" baseline="0" dirty="0"/>
+              <a:t> emulators to run at same time so ill have to use some screenshot magic to make it seem like there’s actually 3</a:t>
+            </a:r>
+            <a:endParaRPr lang="en-US" dirty="0"/>
+          </a:p>
+        </p:txBody>
+      </p:sp>
+      <p:sp>
+        <p:nvSpPr>
+          <p:cNvPr id="4" name="Slide Number Placeholder 3"/>
+          <p:cNvSpPr>
+            <a:spLocks noGrp="1"/>
+          </p:cNvSpPr>
+          <p:nvPr>
+            <p:ph type="sldNum" sz="quarter" idx="10"/>
+          </p:nvPr>
+        </p:nvSpPr>
+        <p:spPr/>
+        <p:txBody>
+          <a:bodyPr/>
+          <a:lstStyle/>
+          <a:p>
+            <a:fld id="{575B6190-1221-4E33-9DD3-5A103E142EBE}" type="slidenum">
+              <a:rPr lang="en-US" smtClean="0"/>
+              <a:t>11</a:t>
+            </a:fld>
+            <a:endParaRPr lang="en-US"/>
+          </a:p>
+        </p:txBody>
+      </p:sp>
+    </p:spTree>
+    <p:extLst>
+      <p:ext uri="{BB962C8B-B14F-4D97-AF65-F5344CB8AC3E}">
+        <p14:creationId xmlns:p14="http://schemas.microsoft.com/office/powerpoint/2010/main" val="3346878057"/>
+      </p:ext>
+    </p:extLst>
+  </p:cSld>
+  <p:clrMapOvr>
+    <a:masterClrMapping/>
+  </p:clrMapOvr>
+</p:notes>
+</file>
+
+<file path=ppt/notesSlides/notesSlide9.xml><?xml version="1.0" encoding="utf-8"?>
+<p:notes xmlns:a="http://schemas.openxmlformats.org/drawingml/2006/main" xmlns:r="http://schemas.openxmlformats.org/officeDocument/2006/relationships" xmlns:p="http://schemas.openxmlformats.org/presentationml/2006/main">
+  <p:cSld>
+    <p:spTree>
+      <p:nvGrpSpPr>
+        <p:cNvPr id="1" name=""/>
+        <p:cNvGrpSpPr/>
+        <p:nvPr/>
+      </p:nvGrpSpPr>
+      <p:grpSpPr>
+        <a:xfrm>
+          <a:off x="0" y="0"/>
+          <a:ext cx="0" cy="0"/>
+          <a:chOff x="0" y="0"/>
+          <a:chExt cx="0" cy="0"/>
+        </a:xfrm>
+      </p:grpSpPr>
+      <p:sp>
+        <p:nvSpPr>
+          <p:cNvPr id="2" name="Slide Image Placeholder 1"/>
+          <p:cNvSpPr>
+            <a:spLocks noGrp="1" noRot="1" noChangeAspect="1"/>
+          </p:cNvSpPr>
+          <p:nvPr>
+            <p:ph type="sldImg"/>
+          </p:nvPr>
+        </p:nvSpPr>
+        <p:spPr/>
+      </p:sp>
+      <p:sp>
+        <p:nvSpPr>
+          <p:cNvPr id="3" name="Notes Placeholder 2"/>
+          <p:cNvSpPr>
+            <a:spLocks noGrp="1"/>
+          </p:cNvSpPr>
+          <p:nvPr>
+            <p:ph type="body" idx="1"/>
+          </p:nvPr>
+        </p:nvSpPr>
+        <p:spPr/>
+        <p:txBody>
+          <a:bodyPr/>
+          <a:lstStyle/>
+          <a:p>
+            <a:r>
+              <a:rPr lang="en-US" dirty="0"/>
+              <a:t>Hacker</a:t>
+            </a:r>
+            <a:r>
+              <a:rPr lang="en-US" baseline="0" dirty="0"/>
+              <a:t> intercepts message from A and has it open in the default app. He then changes the message to let’s meet at the abandoned bridge at 10</a:t>
+            </a:r>
+            <a:endParaRPr lang="en-US" dirty="0"/>
+          </a:p>
+        </p:txBody>
+      </p:sp>
+      <p:sp>
+        <p:nvSpPr>
+          <p:cNvPr id="4" name="Slide Number Placeholder 3"/>
+          <p:cNvSpPr>
+            <a:spLocks noGrp="1"/>
+          </p:cNvSpPr>
+          <p:nvPr>
+            <p:ph type="sldNum" sz="quarter" idx="10"/>
+          </p:nvPr>
+        </p:nvSpPr>
+        <p:spPr/>
+        <p:txBody>
+          <a:bodyPr/>
+          <a:lstStyle/>
+          <a:p>
+            <a:fld id="{575B6190-1221-4E33-9DD3-5A103E142EBE}" type="slidenum">
+              <a:rPr lang="en-US" smtClean="0"/>
+              <a:t>12</a:t>
+            </a:fld>
+            <a:endParaRPr lang="en-US"/>
+          </a:p>
+        </p:txBody>
+      </p:sp>
+    </p:spTree>
+    <p:extLst>
+      <p:ext uri="{BB962C8B-B14F-4D97-AF65-F5344CB8AC3E}">
+        <p14:creationId xmlns:p14="http://schemas.microsoft.com/office/powerpoint/2010/main" val="2219023473"/>
+      </p:ext>
+    </p:extLst>
+  </p:cSld>
+  <p:clrMapOvr>
+    <a:masterClrMapping/>
+  </p:clrMapOvr>
+</p:notes>
+</file>
+
 <file path=ppt/slideLayouts/slideLayout1.xml><?xml version="1.0" encoding="utf-8"?>
 <p:sldLayout xmlns:a="http://schemas.openxmlformats.org/drawingml/2006/main" xmlns:r="http://schemas.openxmlformats.org/officeDocument/2006/relationships" xmlns:p="http://schemas.openxmlformats.org/presentationml/2006/main" type="title" preserve="1">
   <p:cSld name="Title Slide">
@@ -658,7 +1542,7 @@
           <a:effectLst/>
           <a:extLst>
             <a:ext uri="{91240B29-F687-4f45-9708-019B960494DF}">
-              <a14:hiddenLine xmlns:a14="http://schemas.microsoft.com/office/drawing/2010/main" xmlns="" w="9525">
+              <a14:hiddenLine xmlns="" xmlns:a14="http://schemas.microsoft.com/office/drawing/2010/main" w="9525">
                 <a:solidFill>
                   <a:srgbClr val="000000"/>
                 </a:solidFill>
@@ -851,7 +1735,7 @@
             <a:fld id="{08B9EBBA-996F-894A-B54A-D6246ED52CEA}" type="datetimeFigureOut">
               <a:rPr lang="en-US" dirty="0"/>
               <a:pPr/>
-              <a:t>4/8/2017</a:t>
+              <a:t>4/21/2017</a:t>
             </a:fld>
             <a:endParaRPr lang="en-US" dirty="0"/>
           </a:p>
@@ -1166,7 +2050,7 @@
             <a:fld id="{18C79C5D-2A6F-F04D-97DA-BEF2467B64E4}" type="datetimeFigureOut">
               <a:rPr lang="en-US" dirty="0"/>
               <a:pPr/>
-              <a:t>4/8/2017</a:t>
+              <a:t>4/21/2017</a:t>
             </a:fld>
             <a:endParaRPr lang="en-US" dirty="0"/>
           </a:p>
@@ -1651,7 +2535,7 @@
             <a:fld id="{8DFA1846-DA80-1C48-A609-854EA85C59AD}" type="datetimeFigureOut">
               <a:rPr lang="en-US" dirty="0"/>
               <a:pPr/>
-              <a:t>4/8/2017</a:t>
+              <a:t>4/21/2017</a:t>
             </a:fld>
             <a:endParaRPr lang="en-US" dirty="0"/>
           </a:p>
@@ -2017,7 +2901,7 @@
             <a:fld id="{FBF54567-0DE4-3F47-BF90-CB84690072F9}" type="datetimeFigureOut">
               <a:rPr lang="en-US" dirty="0"/>
               <a:pPr/>
-              <a:t>4/8/2017</a:t>
+              <a:t>4/21/2017</a:t>
             </a:fld>
             <a:endParaRPr lang="en-US" dirty="0"/>
           </a:p>
@@ -2168,7 +3052,7 @@
           <a:ln/>
           <a:extLst>
             <a:ext uri="{91240B29-F687-4f45-9708-019B960494DF}">
-              <a14:hiddenLine xmlns:a14="http://schemas.microsoft.com/office/drawing/2010/main" xmlns="" w="9525">
+              <a14:hiddenLine xmlns="" xmlns:a14="http://schemas.microsoft.com/office/drawing/2010/main" w="9525">
                 <a:solidFill>
                   <a:srgbClr val="000000"/>
                 </a:solidFill>
@@ -2287,7 +3171,7 @@
             <a:fld id="{C6C52C72-DE31-F449-A4ED-4C594FD91407}" type="datetimeFigureOut">
               <a:rPr lang="en-US" dirty="0"/>
               <a:pPr/>
-              <a:t>4/8/2017</a:t>
+              <a:t>4/21/2017</a:t>
             </a:fld>
             <a:endParaRPr lang="en-US" dirty="0"/>
           </a:p>
@@ -2440,7 +3324,7 @@
           <a:ln/>
           <a:extLst>
             <a:ext uri="{91240B29-F687-4f45-9708-019B960494DF}">
-              <a14:hiddenLine xmlns:a14="http://schemas.microsoft.com/office/drawing/2010/main" xmlns="" w="9525">
+              <a14:hiddenLine xmlns="" xmlns:a14="http://schemas.microsoft.com/office/drawing/2010/main" w="9525">
                 <a:solidFill>
                   <a:srgbClr val="000000"/>
                 </a:solidFill>
@@ -2569,7 +3453,7 @@
             <a:fld id="{ED62726E-379B-B349-9EED-81ED093FA806}" type="datetimeFigureOut">
               <a:rPr lang="en-US" dirty="0"/>
               <a:pPr/>
-              <a:t>4/8/2017</a:t>
+              <a:t>4/21/2017</a:t>
             </a:fld>
             <a:endParaRPr lang="en-US" dirty="0"/>
           </a:p>
@@ -2720,7 +3604,7 @@
           <a:ln/>
           <a:extLst>
             <a:ext uri="{91240B29-F687-4f45-9708-019B960494DF}">
-              <a14:hiddenLine xmlns:a14="http://schemas.microsoft.com/office/drawing/2010/main" xmlns="" w="9525">
+              <a14:hiddenLine xmlns="" xmlns:a14="http://schemas.microsoft.com/office/drawing/2010/main" w="9525">
                 <a:solidFill>
                   <a:srgbClr val="000000"/>
                 </a:solidFill>
@@ -2849,7 +3733,7 @@
             <a:fld id="{9B3A1323-8D79-1946-B0D7-40001CF92E9D}" type="datetimeFigureOut">
               <a:rPr lang="en-US" dirty="0"/>
               <a:pPr/>
-              <a:t>4/8/2017</a:t>
+              <a:t>4/21/2017</a:t>
             </a:fld>
             <a:endParaRPr lang="en-US" dirty="0"/>
           </a:p>
@@ -3189,7 +4073,7 @@
             <a:fld id="{8DFA1846-DA80-1C48-A609-854EA85C59AD}" type="datetimeFigureOut">
               <a:rPr lang="en-US" dirty="0"/>
               <a:pPr/>
-              <a:t>4/8/2017</a:t>
+              <a:t>4/21/2017</a:t>
             </a:fld>
             <a:endParaRPr lang="en-US" dirty="0"/>
           </a:p>
@@ -3340,7 +4224,7 @@
           <a:ln/>
           <a:extLst>
             <a:ext uri="{91240B29-F687-4f45-9708-019B960494DF}">
-              <a14:hiddenLine xmlns:a14="http://schemas.microsoft.com/office/drawing/2010/main" xmlns="" w="9525">
+              <a14:hiddenLine xmlns="" xmlns:a14="http://schemas.microsoft.com/office/drawing/2010/main" w="9525">
                 <a:solidFill>
                   <a:srgbClr val="000000"/>
                 </a:solidFill>
@@ -3525,7 +4409,7 @@
             <a:fld id="{57302355-E14B-8545-A8F8-0FE83CC9D524}" type="datetimeFigureOut">
               <a:rPr lang="en-US" dirty="0"/>
               <a:pPr/>
-              <a:t>4/8/2017</a:t>
+              <a:t>4/21/2017</a:t>
             </a:fld>
             <a:endParaRPr lang="en-US" dirty="0"/>
           </a:p>
@@ -3676,7 +4560,7 @@
           <a:ln/>
           <a:extLst>
             <a:ext uri="{91240B29-F687-4f45-9708-019B960494DF}">
-              <a14:hiddenLine xmlns:a14="http://schemas.microsoft.com/office/drawing/2010/main" xmlns="" w="9525">
+              <a14:hiddenLine xmlns="" xmlns:a14="http://schemas.microsoft.com/office/drawing/2010/main" w="9525">
                 <a:solidFill>
                   <a:srgbClr val="000000"/>
                 </a:solidFill>
@@ -3999,7 +4883,7 @@
             <a:fld id="{02640F58-564D-2B4F-AE67-E407BA4FCF45}" type="datetimeFigureOut">
               <a:rPr lang="en-US" dirty="0"/>
               <a:pPr/>
-              <a:t>4/8/2017</a:t>
+              <a:t>4/21/2017</a:t>
             </a:fld>
             <a:endParaRPr lang="en-US" dirty="0"/>
           </a:p>
@@ -4150,7 +5034,7 @@
           <a:ln/>
           <a:extLst>
             <a:ext uri="{91240B29-F687-4f45-9708-019B960494DF}">
-              <a14:hiddenLine xmlns:a14="http://schemas.microsoft.com/office/drawing/2010/main" xmlns="" w="9525">
+              <a14:hiddenLine xmlns="" xmlns:a14="http://schemas.microsoft.com/office/drawing/2010/main" w="9525">
                 <a:solidFill>
                   <a:srgbClr val="000000"/>
                 </a:solidFill>
@@ -4217,7 +5101,7 @@
             <a:fld id="{F13A34C8-038E-2045-AF43-DF7DBB8E0E9E}" type="datetimeFigureOut">
               <a:rPr lang="en-US" dirty="0"/>
               <a:pPr/>
-              <a:t>4/8/2017</a:t>
+              <a:t>4/21/2017</a:t>
             </a:fld>
             <a:endParaRPr lang="en-US" dirty="0"/>
           </a:p>
@@ -4309,7 +5193,7 @@
             <a:fld id="{8818C68F-D26B-8F47-958C-23B49CF8A634}" type="datetimeFigureOut">
               <a:rPr lang="en-US" dirty="0"/>
               <a:pPr/>
-              <a:t>4/8/2017</a:t>
+              <a:t>4/21/2017</a:t>
             </a:fld>
             <a:endParaRPr lang="en-US" dirty="0"/>
           </a:p>
@@ -4573,7 +5457,7 @@
           <a:ln/>
           <a:extLst>
             <a:ext uri="{91240B29-F687-4f45-9708-019B960494DF}">
-              <a14:hiddenLine xmlns:a14="http://schemas.microsoft.com/office/drawing/2010/main" xmlns="" w="9525">
+              <a14:hiddenLine xmlns="" xmlns:a14="http://schemas.microsoft.com/office/drawing/2010/main" w="9525">
                 <a:solidFill>
                   <a:srgbClr val="000000"/>
                 </a:solidFill>
@@ -4773,7 +5657,7 @@
             <a:fld id="{D0DF5E60-9974-AC48-9591-99C2BB44B7CF}" type="datetimeFigureOut">
               <a:rPr lang="en-US" dirty="0"/>
               <a:pPr/>
-              <a:t>4/8/2017</a:t>
+              <a:t>4/21/2017</a:t>
             </a:fld>
             <a:endParaRPr lang="en-US" dirty="0"/>
           </a:p>
@@ -5083,7 +5967,7 @@
             <a:fld id="{18C79C5D-2A6F-F04D-97DA-BEF2467B64E4}" type="datetimeFigureOut">
               <a:rPr lang="en-US" dirty="0"/>
               <a:pPr/>
-              <a:t>4/8/2017</a:t>
+              <a:t>4/21/2017</a:t>
             </a:fld>
             <a:endParaRPr lang="en-US" dirty="0"/>
           </a:p>
@@ -5350,7 +6234,7 @@
             <a:fld id="{09B482E8-6E0E-1B4F-B1FD-C69DB9E858D9}" type="datetimeFigureOut">
               <a:rPr lang="en-US" dirty="0"/>
               <a:pPr/>
-              <a:t>4/8/2017</a:t>
+              <a:t>4/21/2017</a:t>
             </a:fld>
             <a:endParaRPr lang="en-US" dirty="0"/>
           </a:p>
@@ -5885,7 +6769,11 @@
           <a:bodyPr/>
           <a:lstStyle/>
           <a:p>
-            <a:endParaRPr lang="en-US"/>
+            <a:r>
+              <a:rPr lang="en-US" dirty="0"/>
+              <a:t>Man in the Middle Attack</a:t>
+            </a:r>
+            <a:endParaRPr lang="en-US" dirty="0"/>
           </a:p>
         </p:txBody>
       </p:sp>
@@ -5904,14 +6792,73 @@
           <a:bodyPr/>
           <a:lstStyle/>
           <a:p>
-            <a:endParaRPr lang="en-US"/>
-          </a:p>
-        </p:txBody>
-      </p:sp>
+            <a:r>
+              <a:rPr lang="en-US" dirty="0"/>
+              <a:t>When two parties or a client/server try to communicate with one another in a legitimate way, but all of the traffic is unknowingly going through a 3</a:t>
+            </a:r>
+            <a:r>
+              <a:rPr lang="en-US" baseline="30000" dirty="0"/>
+              <a:t>rd</a:t>
+            </a:r>
+            <a:r>
+              <a:rPr lang="en-US" dirty="0"/>
+              <a:t> party</a:t>
+            </a:r>
+          </a:p>
+        </p:txBody>
+      </p:sp>
+      <p:pic>
+        <p:nvPicPr>
+          <p:cNvPr id="4" name="Picture 2" descr="Image result for man in the middle attack"/>
+          <p:cNvPicPr>
+            <a:picLocks noChangeAspect="1" noChangeArrowheads="1"/>
+          </p:cNvPicPr>
+          <p:nvPr/>
+        </p:nvPicPr>
+        <p:blipFill>
+          <a:blip r:embed="rId3">
+            <a:extLst>
+              <a:ext uri="{28A0092B-C50C-407E-A947-70E740481C1C}">
+                <a14:useLocalDpi xmlns:a14="http://schemas.microsoft.com/office/drawing/2010/main" val="0"/>
+              </a:ext>
+            </a:extLst>
+          </a:blip>
+          <a:srcRect/>
+          <a:stretch>
+            <a:fillRect/>
+          </a:stretch>
+        </p:blipFill>
+        <p:spPr bwMode="auto">
+          <a:xfrm>
+            <a:off x="6095999" y="4405243"/>
+            <a:ext cx="5524500" cy="2343150"/>
+          </a:xfrm>
+          <a:prstGeom prst="rect">
+            <a:avLst/>
+          </a:prstGeom>
+          <a:noFill/>
+          <a:effectLst>
+            <a:outerShdw blurRad="50800" dir="14400000">
+              <a:srgbClr val="000000">
+                <a:alpha val="40000"/>
+              </a:srgbClr>
+            </a:outerShdw>
+          </a:effectLst>
+          <a:extLst>
+            <a:ext uri="{909E8E84-426E-40DD-AFC4-6F175D3DCCD1}">
+              <a14:hiddenFill xmlns:a14="http://schemas.microsoft.com/office/drawing/2010/main">
+                <a:solidFill>
+                  <a:srgbClr val="FFFFFF"/>
+                </a:solidFill>
+              </a14:hiddenFill>
+            </a:ext>
+          </a:extLst>
+        </p:spPr>
+      </p:pic>
     </p:spTree>
     <p:extLst>
       <p:ext uri="{BB962C8B-B14F-4D97-AF65-F5344CB8AC3E}">
-        <p14:creationId xmlns:p14="http://schemas.microsoft.com/office/powerpoint/2010/main" val="2789940899"/>
+        <p14:creationId xmlns:p14="http://schemas.microsoft.com/office/powerpoint/2010/main" val="1605017810"/>
       </p:ext>
     </p:extLst>
   </p:cSld>
@@ -5948,7 +6895,12 @@
             <p:ph type="title"/>
           </p:nvPr>
         </p:nvSpPr>
-        <p:spPr/>
+        <p:spPr>
+          <a:xfrm>
+            <a:off x="3788728" y="-352308"/>
+            <a:ext cx="1339462" cy="118700"/>
+          </a:xfrm>
+        </p:spPr>
         <p:txBody>
           <a:bodyPr/>
           <a:lstStyle/>
@@ -5957,32 +6909,511 @@
               <a:rPr lang="en-US" dirty="0"/>
               <a:t>Man in the Middle Attack</a:t>
             </a:r>
-          </a:p>
-        </p:txBody>
-      </p:sp>
-      <p:sp>
-        <p:nvSpPr>
-          <p:cNvPr id="3" name="Content Placeholder 2"/>
-          <p:cNvSpPr>
-            <a:spLocks noGrp="1"/>
-          </p:cNvSpPr>
+            <a:endParaRPr lang="en-US" dirty="0"/>
+          </a:p>
+        </p:txBody>
+      </p:sp>
+      <p:pic>
+        <p:nvPicPr>
+          <p:cNvPr id="6" name="Content Placeholder 5"/>
+          <p:cNvPicPr>
+            <a:picLocks noGrp="1" noChangeAspect="1"/>
+          </p:cNvPicPr>
           <p:nvPr>
             <p:ph idx="1"/>
           </p:nvPr>
-        </p:nvSpPr>
-        <p:spPr/>
-        <p:txBody>
-          <a:bodyPr/>
-          <a:lstStyle/>
-          <a:p>
-            <a:endParaRPr lang="en-US"/>
-          </a:p>
-        </p:txBody>
-      </p:sp>
+        </p:nvPicPr>
+        <p:blipFill>
+          <a:blip r:embed="rId3"/>
+          <a:stretch>
+            <a:fillRect/>
+          </a:stretch>
+        </p:blipFill>
+        <p:spPr>
+          <a:xfrm>
+            <a:off x="4865225" y="1597295"/>
+            <a:ext cx="2461548" cy="4438246"/>
+          </a:xfrm>
+          <a:prstGeom prst="rect">
+            <a:avLst/>
+          </a:prstGeom>
+        </p:spPr>
+      </p:pic>
+      <p:pic>
+        <p:nvPicPr>
+          <p:cNvPr id="4" name="Picture 3"/>
+          <p:cNvPicPr>
+            <a:picLocks noChangeAspect="1"/>
+          </p:cNvPicPr>
+          <p:nvPr/>
+        </p:nvPicPr>
+        <p:blipFill>
+          <a:blip r:embed="rId4"/>
+          <a:stretch>
+            <a:fillRect/>
+          </a:stretch>
+        </p:blipFill>
+        <p:spPr>
+          <a:xfrm>
+            <a:off x="331198" y="1873189"/>
+            <a:ext cx="2335963" cy="4162352"/>
+          </a:xfrm>
+          <a:prstGeom prst="rect">
+            <a:avLst/>
+          </a:prstGeom>
+        </p:spPr>
+      </p:pic>
+      <p:pic>
+        <p:nvPicPr>
+          <p:cNvPr id="5" name="Picture 4"/>
+          <p:cNvPicPr>
+            <a:picLocks noChangeAspect="1"/>
+          </p:cNvPicPr>
+          <p:nvPr/>
+        </p:nvPicPr>
+        <p:blipFill>
+          <a:blip r:embed="rId4"/>
+          <a:stretch>
+            <a:fillRect/>
+          </a:stretch>
+        </p:blipFill>
+        <p:spPr>
+          <a:xfrm>
+            <a:off x="9787802" y="1731441"/>
+            <a:ext cx="2316323" cy="4127357"/>
+          </a:xfrm>
+          <a:prstGeom prst="rect">
+            <a:avLst/>
+          </a:prstGeom>
+        </p:spPr>
+      </p:pic>
+      <p:pic>
+        <p:nvPicPr>
+          <p:cNvPr id="2050" name="Picture 2" descr="Image result for arrow image"/>
+          <p:cNvPicPr>
+            <a:picLocks noChangeAspect="1" noChangeArrowheads="1"/>
+          </p:cNvPicPr>
+          <p:nvPr/>
+        </p:nvPicPr>
+        <p:blipFill>
+          <a:blip r:embed="rId5">
+            <a:extLst>
+              <a:ext uri="{28A0092B-C50C-407E-A947-70E740481C1C}">
+                <a14:useLocalDpi xmlns:a14="http://schemas.microsoft.com/office/drawing/2010/main" val="0"/>
+              </a:ext>
+            </a:extLst>
+          </a:blip>
+          <a:srcRect/>
+          <a:stretch>
+            <a:fillRect/>
+          </a:stretch>
+        </p:blipFill>
+        <p:spPr bwMode="auto">
+          <a:xfrm>
+            <a:off x="2978728" y="3618216"/>
+            <a:ext cx="1544715" cy="624926"/>
+          </a:xfrm>
+          <a:prstGeom prst="rect">
+            <a:avLst/>
+          </a:prstGeom>
+          <a:noFill/>
+          <a:extLst>
+            <a:ext uri="{909E8E84-426E-40DD-AFC4-6F175D3DCCD1}">
+              <a14:hiddenFill xmlns:a14="http://schemas.microsoft.com/office/drawing/2010/main">
+                <a:solidFill>
+                  <a:srgbClr val="FFFFFF"/>
+                </a:solidFill>
+              </a14:hiddenFill>
+            </a:ext>
+          </a:extLst>
+        </p:spPr>
+      </p:pic>
+      <p:sp>
+        <p:nvSpPr>
+          <p:cNvPr id="8" name="Title 1"/>
+          <p:cNvSpPr txBox="1">
+            <a:spLocks/>
+          </p:cNvSpPr>
+          <p:nvPr/>
+        </p:nvSpPr>
+        <p:spPr>
+          <a:xfrm>
+            <a:off x="8575272" y="-546137"/>
+            <a:ext cx="1339462" cy="118700"/>
+          </a:xfrm>
+          <a:prstGeom prst="rect">
+            <a:avLst/>
+          </a:prstGeom>
+          <a:effectLst>
+            <a:outerShdw blurRad="50800" dir="14400000">
+              <a:srgbClr val="000000">
+                <a:alpha val="60000"/>
+              </a:srgbClr>
+            </a:outerShdw>
+          </a:effectLst>
+        </p:spPr>
+        <p:txBody>
+          <a:bodyPr vert="horz" lIns="91440" tIns="45720" rIns="91440" bIns="45720" rtlCol="0" anchor="b">
+            <a:noAutofit/>
+          </a:bodyPr>
+          <a:lstStyle>
+            <a:lvl1pPr algn="l" defTabSz="457200" rtl="0" eaLnBrk="1" latinLnBrk="0" hangingPunct="1">
+              <a:spcBef>
+                <a:spcPct val="0"/>
+              </a:spcBef>
+              <a:buNone/>
+              <a:defRPr sz="4000" b="1" kern="1200">
+                <a:solidFill>
+                  <a:srgbClr val="FEFEFE"/>
+                </a:solidFill>
+                <a:latin typeface="+mj-lt"/>
+                <a:ea typeface="+mj-ea"/>
+                <a:cs typeface="+mj-cs"/>
+              </a:defRPr>
+            </a:lvl1pPr>
+            <a:lvl2pPr eaLnBrk="1" hangingPunct="1">
+              <a:defRPr>
+                <a:solidFill>
+                  <a:schemeClr val="tx2"/>
+                </a:solidFill>
+              </a:defRPr>
+            </a:lvl2pPr>
+            <a:lvl3pPr eaLnBrk="1" hangingPunct="1">
+              <a:defRPr>
+                <a:solidFill>
+                  <a:schemeClr val="tx2"/>
+                </a:solidFill>
+              </a:defRPr>
+            </a:lvl3pPr>
+            <a:lvl4pPr eaLnBrk="1" hangingPunct="1">
+              <a:defRPr>
+                <a:solidFill>
+                  <a:schemeClr val="tx2"/>
+                </a:solidFill>
+              </a:defRPr>
+            </a:lvl4pPr>
+            <a:lvl5pPr eaLnBrk="1" hangingPunct="1">
+              <a:defRPr>
+                <a:solidFill>
+                  <a:schemeClr val="tx2"/>
+                </a:solidFill>
+              </a:defRPr>
+            </a:lvl5pPr>
+            <a:lvl6pPr eaLnBrk="1" hangingPunct="1">
+              <a:defRPr>
+                <a:solidFill>
+                  <a:schemeClr val="tx2"/>
+                </a:solidFill>
+              </a:defRPr>
+            </a:lvl6pPr>
+            <a:lvl7pPr eaLnBrk="1" hangingPunct="1">
+              <a:defRPr>
+                <a:solidFill>
+                  <a:schemeClr val="tx2"/>
+                </a:solidFill>
+              </a:defRPr>
+            </a:lvl7pPr>
+            <a:lvl8pPr eaLnBrk="1" hangingPunct="1">
+              <a:defRPr>
+                <a:solidFill>
+                  <a:schemeClr val="tx2"/>
+                </a:solidFill>
+              </a:defRPr>
+            </a:lvl8pPr>
+            <a:lvl9pPr eaLnBrk="1" hangingPunct="1">
+              <a:defRPr>
+                <a:solidFill>
+                  <a:schemeClr val="tx2"/>
+                </a:solidFill>
+              </a:defRPr>
+            </a:lvl9pPr>
+          </a:lstStyle>
+          <a:p>
+            <a:r>
+              <a:rPr lang="en-US"/>
+              <a:t>Man in the Middle Attack</a:t>
+            </a:r>
+            <a:endParaRPr lang="en-US" dirty="0"/>
+          </a:p>
+        </p:txBody>
+      </p:sp>
+      <p:pic>
+        <p:nvPicPr>
+          <p:cNvPr id="9" name="Picture 2" descr="Image result for arrow image"/>
+          <p:cNvPicPr>
+            <a:picLocks noChangeAspect="1" noChangeArrowheads="1"/>
+          </p:cNvPicPr>
+          <p:nvPr/>
+        </p:nvPicPr>
+        <p:blipFill>
+          <a:blip r:embed="rId5">
+            <a:extLst>
+              <a:ext uri="{28A0092B-C50C-407E-A947-70E740481C1C}">
+                <a14:useLocalDpi xmlns:a14="http://schemas.microsoft.com/office/drawing/2010/main" val="0"/>
+              </a:ext>
+            </a:extLst>
+          </a:blip>
+          <a:srcRect/>
+          <a:stretch>
+            <a:fillRect/>
+          </a:stretch>
+        </p:blipFill>
+        <p:spPr bwMode="auto">
+          <a:xfrm>
+            <a:off x="7765272" y="3424387"/>
+            <a:ext cx="1544715" cy="624926"/>
+          </a:xfrm>
+          <a:prstGeom prst="rect">
+            <a:avLst/>
+          </a:prstGeom>
+          <a:noFill/>
+          <a:extLst>
+            <a:ext uri="{909E8E84-426E-40DD-AFC4-6F175D3DCCD1}">
+              <a14:hiddenFill xmlns:a14="http://schemas.microsoft.com/office/drawing/2010/main">
+                <a:solidFill>
+                  <a:srgbClr val="FFFFFF"/>
+                </a:solidFill>
+              </a14:hiddenFill>
+            </a:ext>
+          </a:extLst>
+        </p:spPr>
+      </p:pic>
+      <p:sp>
+        <p:nvSpPr>
+          <p:cNvPr id="10" name="Title 1"/>
+          <p:cNvSpPr txBox="1">
+            <a:spLocks/>
+          </p:cNvSpPr>
+          <p:nvPr/>
+        </p:nvSpPr>
+        <p:spPr>
+          <a:xfrm>
+            <a:off x="810000" y="447188"/>
+            <a:ext cx="10571998" cy="970450"/>
+          </a:xfrm>
+          <a:prstGeom prst="rect">
+            <a:avLst/>
+          </a:prstGeom>
+          <a:effectLst>
+            <a:outerShdw blurRad="50800" dir="14400000">
+              <a:srgbClr val="000000">
+                <a:alpha val="60000"/>
+              </a:srgbClr>
+            </a:outerShdw>
+          </a:effectLst>
+        </p:spPr>
+        <p:txBody>
+          <a:bodyPr vert="horz" lIns="91440" tIns="45720" rIns="91440" bIns="45720" rtlCol="0" anchor="b">
+            <a:noAutofit/>
+          </a:bodyPr>
+          <a:lstStyle>
+            <a:lvl1pPr algn="l" defTabSz="457200" rtl="0" eaLnBrk="1" latinLnBrk="0" hangingPunct="1">
+              <a:spcBef>
+                <a:spcPct val="0"/>
+              </a:spcBef>
+              <a:buNone/>
+              <a:defRPr sz="4000" b="1" kern="1200">
+                <a:solidFill>
+                  <a:srgbClr val="FEFEFE"/>
+                </a:solidFill>
+                <a:latin typeface="+mj-lt"/>
+                <a:ea typeface="+mj-ea"/>
+                <a:cs typeface="+mj-cs"/>
+              </a:defRPr>
+            </a:lvl1pPr>
+            <a:lvl2pPr eaLnBrk="1" hangingPunct="1">
+              <a:defRPr>
+                <a:solidFill>
+                  <a:schemeClr val="tx2"/>
+                </a:solidFill>
+              </a:defRPr>
+            </a:lvl2pPr>
+            <a:lvl3pPr eaLnBrk="1" hangingPunct="1">
+              <a:defRPr>
+                <a:solidFill>
+                  <a:schemeClr val="tx2"/>
+                </a:solidFill>
+              </a:defRPr>
+            </a:lvl3pPr>
+            <a:lvl4pPr eaLnBrk="1" hangingPunct="1">
+              <a:defRPr>
+                <a:solidFill>
+                  <a:schemeClr val="tx2"/>
+                </a:solidFill>
+              </a:defRPr>
+            </a:lvl4pPr>
+            <a:lvl5pPr eaLnBrk="1" hangingPunct="1">
+              <a:defRPr>
+                <a:solidFill>
+                  <a:schemeClr val="tx2"/>
+                </a:solidFill>
+              </a:defRPr>
+            </a:lvl5pPr>
+            <a:lvl6pPr eaLnBrk="1" hangingPunct="1">
+              <a:defRPr>
+                <a:solidFill>
+                  <a:schemeClr val="tx2"/>
+                </a:solidFill>
+              </a:defRPr>
+            </a:lvl6pPr>
+            <a:lvl7pPr eaLnBrk="1" hangingPunct="1">
+              <a:defRPr>
+                <a:solidFill>
+                  <a:schemeClr val="tx2"/>
+                </a:solidFill>
+              </a:defRPr>
+            </a:lvl7pPr>
+            <a:lvl8pPr eaLnBrk="1" hangingPunct="1">
+              <a:defRPr>
+                <a:solidFill>
+                  <a:schemeClr val="tx2"/>
+                </a:solidFill>
+              </a:defRPr>
+            </a:lvl8pPr>
+            <a:lvl9pPr eaLnBrk="1" hangingPunct="1">
+              <a:defRPr>
+                <a:solidFill>
+                  <a:schemeClr val="tx2"/>
+                </a:solidFill>
+              </a:defRPr>
+            </a:lvl9pPr>
+          </a:lstStyle>
+          <a:p>
+            <a:r>
+              <a:rPr lang="en-US" dirty="0"/>
+              <a:t>Man in the Middle Attack</a:t>
+            </a:r>
+            <a:endParaRPr lang="en-US" dirty="0"/>
+          </a:p>
+        </p:txBody>
+      </p:sp>
+      <p:pic>
+        <p:nvPicPr>
+          <p:cNvPr id="2052" name="Picture 4" descr="Image result for A"/>
+          <p:cNvPicPr>
+            <a:picLocks noChangeAspect="1" noChangeArrowheads="1"/>
+          </p:cNvPicPr>
+          <p:nvPr/>
+        </p:nvPicPr>
+        <p:blipFill>
+          <a:blip r:embed="rId6">
+            <a:extLst>
+              <a:ext uri="{28A0092B-C50C-407E-A947-70E740481C1C}">
+                <a14:useLocalDpi xmlns:a14="http://schemas.microsoft.com/office/drawing/2010/main" val="0"/>
+              </a:ext>
+            </a:extLst>
+          </a:blip>
+          <a:srcRect/>
+          <a:stretch>
+            <a:fillRect/>
+          </a:stretch>
+        </p:blipFill>
+        <p:spPr bwMode="auto">
+          <a:xfrm>
+            <a:off x="1225118" y="4515035"/>
+            <a:ext cx="681084" cy="681084"/>
+          </a:xfrm>
+          <a:prstGeom prst="rect">
+            <a:avLst/>
+          </a:prstGeom>
+          <a:noFill/>
+          <a:extLst>
+            <a:ext uri="{909E8E84-426E-40DD-AFC4-6F175D3DCCD1}">
+              <a14:hiddenFill xmlns:a14="http://schemas.microsoft.com/office/drawing/2010/main">
+                <a:solidFill>
+                  <a:srgbClr val="FFFFFF"/>
+                </a:solidFill>
+              </a14:hiddenFill>
+            </a:ext>
+          </a:extLst>
+        </p:spPr>
+      </p:pic>
+      <p:pic>
+        <p:nvPicPr>
+          <p:cNvPr id="2056" name="Picture 8" descr="Image result for B"/>
+          <p:cNvPicPr>
+            <a:picLocks noChangeAspect="1" noChangeArrowheads="1"/>
+          </p:cNvPicPr>
+          <p:nvPr/>
+        </p:nvPicPr>
+        <p:blipFill>
+          <a:blip r:embed="rId7">
+            <a:extLst>
+              <a:ext uri="{28A0092B-C50C-407E-A947-70E740481C1C}">
+                <a14:useLocalDpi xmlns:a14="http://schemas.microsoft.com/office/drawing/2010/main" val="0"/>
+              </a:ext>
+            </a:extLst>
+          </a:blip>
+          <a:srcRect/>
+          <a:stretch>
+            <a:fillRect/>
+          </a:stretch>
+        </p:blipFill>
+        <p:spPr bwMode="auto">
+          <a:xfrm>
+            <a:off x="10590288" y="4306831"/>
+            <a:ext cx="711350" cy="711350"/>
+          </a:xfrm>
+          <a:prstGeom prst="rect">
+            <a:avLst/>
+          </a:prstGeom>
+          <a:noFill/>
+          <a:extLst>
+            <a:ext uri="{909E8E84-426E-40DD-AFC4-6F175D3DCCD1}">
+              <a14:hiddenFill xmlns:a14="http://schemas.microsoft.com/office/drawing/2010/main">
+                <a:solidFill>
+                  <a:srgbClr val="FFFFFF"/>
+                </a:solidFill>
+              </a14:hiddenFill>
+            </a:ext>
+          </a:extLst>
+        </p:spPr>
+      </p:pic>
+      <p:pic>
+        <p:nvPicPr>
+          <p:cNvPr id="2058" name="Picture 10" descr="Image result for hacker"/>
+          <p:cNvPicPr>
+            <a:picLocks noChangeAspect="1" noChangeArrowheads="1"/>
+          </p:cNvPicPr>
+          <p:nvPr/>
+        </p:nvPicPr>
+        <p:blipFill>
+          <a:blip r:embed="rId8">
+            <a:extLst>
+              <a:ext uri="{28A0092B-C50C-407E-A947-70E740481C1C}">
+                <a14:useLocalDpi xmlns:a14="http://schemas.microsoft.com/office/drawing/2010/main" val="0"/>
+              </a:ext>
+            </a:extLst>
+          </a:blip>
+          <a:srcRect/>
+          <a:stretch>
+            <a:fillRect/>
+          </a:stretch>
+        </p:blipFill>
+        <p:spPr bwMode="auto">
+          <a:xfrm>
+            <a:off x="5521910" y="4243142"/>
+            <a:ext cx="1286939" cy="700375"/>
+          </a:xfrm>
+          <a:prstGeom prst="rect">
+            <a:avLst/>
+          </a:prstGeom>
+          <a:noFill/>
+          <a:extLst>
+            <a:ext uri="{909E8E84-426E-40DD-AFC4-6F175D3DCCD1}">
+              <a14:hiddenFill xmlns:a14="http://schemas.microsoft.com/office/drawing/2010/main">
+                <a:solidFill>
+                  <a:srgbClr val="FFFFFF"/>
+                </a:solidFill>
+              </a14:hiddenFill>
+            </a:ext>
+          </a:extLst>
+        </p:spPr>
+      </p:pic>
     </p:spTree>
     <p:extLst>
       <p:ext uri="{BB962C8B-B14F-4D97-AF65-F5344CB8AC3E}">
-        <p14:creationId xmlns:p14="http://schemas.microsoft.com/office/powerpoint/2010/main" val="3867449544"/>
+        <p14:creationId xmlns:p14="http://schemas.microsoft.com/office/powerpoint/2010/main" val="1328075012"/>
       </p:ext>
     </p:extLst>
   </p:cSld>
@@ -6026,19 +7457,332 @@
           <a:p>
             <a:r>
               <a:rPr lang="en-US" dirty="0"/>
-              <a:t>References</a:t>
-            </a:r>
-          </a:p>
-        </p:txBody>
-      </p:sp>
-      <p:sp>
-        <p:nvSpPr>
-          <p:cNvPr id="3" name="Content Placeholder 2"/>
-          <p:cNvSpPr>
-            <a:spLocks noGrp="1"/>
-          </p:cNvSpPr>
+              <a:t>Man in the Middle Attack</a:t>
+            </a:r>
+            <a:br>
+              <a:rPr lang="en-US" dirty="0"/>
+            </a:br>
+            <a:endParaRPr lang="en-US" dirty="0"/>
+          </a:p>
+        </p:txBody>
+      </p:sp>
+      <p:pic>
+        <p:nvPicPr>
+          <p:cNvPr id="4" name="Content Placeholder 3"/>
+          <p:cNvPicPr>
+            <a:picLocks noGrp="1" noChangeAspect="1"/>
+          </p:cNvPicPr>
           <p:nvPr>
             <p:ph idx="1"/>
+          </p:nvPr>
+        </p:nvPicPr>
+        <p:blipFill>
+          <a:blip r:embed="rId3"/>
+          <a:stretch>
+            <a:fillRect/>
+          </a:stretch>
+        </p:blipFill>
+        <p:spPr>
+          <a:xfrm>
+            <a:off x="0" y="1553851"/>
+            <a:ext cx="2834336" cy="5024504"/>
+          </a:xfrm>
+          <a:prstGeom prst="rect">
+            <a:avLst/>
+          </a:prstGeom>
+        </p:spPr>
+      </p:pic>
+      <p:pic>
+        <p:nvPicPr>
+          <p:cNvPr id="5" name="Picture 4" descr="Image result for A"/>
+          <p:cNvPicPr>
+            <a:picLocks noChangeAspect="1" noChangeArrowheads="1"/>
+          </p:cNvPicPr>
+          <p:nvPr/>
+        </p:nvPicPr>
+        <p:blipFill>
+          <a:blip r:embed="rId4">
+            <a:extLst>
+              <a:ext uri="{28A0092B-C50C-407E-A947-70E740481C1C}">
+                <a14:useLocalDpi xmlns:a14="http://schemas.microsoft.com/office/drawing/2010/main" val="0"/>
+              </a:ext>
+            </a:extLst>
+          </a:blip>
+          <a:srcRect/>
+          <a:stretch>
+            <a:fillRect/>
+          </a:stretch>
+        </p:blipFill>
+        <p:spPr bwMode="auto">
+          <a:xfrm>
+            <a:off x="1076626" y="4506157"/>
+            <a:ext cx="681084" cy="681084"/>
+          </a:xfrm>
+          <a:prstGeom prst="rect">
+            <a:avLst/>
+          </a:prstGeom>
+          <a:noFill/>
+          <a:extLst>
+            <a:ext uri="{909E8E84-426E-40DD-AFC4-6F175D3DCCD1}">
+              <a14:hiddenFill xmlns:a14="http://schemas.microsoft.com/office/drawing/2010/main">
+                <a:solidFill>
+                  <a:srgbClr val="FFFFFF"/>
+                </a:solidFill>
+              </a14:hiddenFill>
+            </a:ext>
+          </a:extLst>
+        </p:spPr>
+      </p:pic>
+      <p:pic>
+        <p:nvPicPr>
+          <p:cNvPr id="6" name="Picture 5"/>
+          <p:cNvPicPr>
+            <a:picLocks noChangeAspect="1"/>
+          </p:cNvPicPr>
+          <p:nvPr/>
+        </p:nvPicPr>
+        <p:blipFill>
+          <a:blip r:embed="rId5"/>
+          <a:stretch>
+            <a:fillRect/>
+          </a:stretch>
+        </p:blipFill>
+        <p:spPr>
+          <a:xfrm>
+            <a:off x="4279902" y="1417638"/>
+            <a:ext cx="2973152" cy="5238108"/>
+          </a:xfrm>
+          <a:prstGeom prst="rect">
+            <a:avLst/>
+          </a:prstGeom>
+        </p:spPr>
+      </p:pic>
+      <p:pic>
+        <p:nvPicPr>
+          <p:cNvPr id="7" name="Picture 10" descr="Image result for hacker"/>
+          <p:cNvPicPr>
+            <a:picLocks noChangeAspect="1" noChangeArrowheads="1"/>
+          </p:cNvPicPr>
+          <p:nvPr/>
+        </p:nvPicPr>
+        <p:blipFill>
+          <a:blip r:embed="rId6">
+            <a:extLst>
+              <a:ext uri="{28A0092B-C50C-407E-A947-70E740481C1C}">
+                <a14:useLocalDpi xmlns:a14="http://schemas.microsoft.com/office/drawing/2010/main" val="0"/>
+              </a:ext>
+            </a:extLst>
+          </a:blip>
+          <a:srcRect/>
+          <a:stretch>
+            <a:fillRect/>
+          </a:stretch>
+        </p:blipFill>
+        <p:spPr bwMode="auto">
+          <a:xfrm>
+            <a:off x="5017299" y="2847604"/>
+            <a:ext cx="1286939" cy="700375"/>
+          </a:xfrm>
+          <a:prstGeom prst="rect">
+            <a:avLst/>
+          </a:prstGeom>
+          <a:noFill/>
+          <a:extLst>
+            <a:ext uri="{909E8E84-426E-40DD-AFC4-6F175D3DCCD1}">
+              <a14:hiddenFill xmlns:a14="http://schemas.microsoft.com/office/drawing/2010/main">
+                <a:solidFill>
+                  <a:srgbClr val="FFFFFF"/>
+                </a:solidFill>
+              </a14:hiddenFill>
+            </a:ext>
+          </a:extLst>
+        </p:spPr>
+      </p:pic>
+      <p:pic>
+        <p:nvPicPr>
+          <p:cNvPr id="8" name="Picture 2" descr="Image result for arrow image"/>
+          <p:cNvPicPr>
+            <a:picLocks noChangeAspect="1" noChangeArrowheads="1"/>
+          </p:cNvPicPr>
+          <p:nvPr/>
+        </p:nvPicPr>
+        <p:blipFill>
+          <a:blip r:embed="rId7">
+            <a:extLst>
+              <a:ext uri="{28A0092B-C50C-407E-A947-70E740481C1C}">
+                <a14:useLocalDpi xmlns:a14="http://schemas.microsoft.com/office/drawing/2010/main" val="0"/>
+              </a:ext>
+            </a:extLst>
+          </a:blip>
+          <a:srcRect/>
+          <a:stretch>
+            <a:fillRect/>
+          </a:stretch>
+        </p:blipFill>
+        <p:spPr bwMode="auto">
+          <a:xfrm>
+            <a:off x="3088053" y="3547979"/>
+            <a:ext cx="995676" cy="624926"/>
+          </a:xfrm>
+          <a:prstGeom prst="rect">
+            <a:avLst/>
+          </a:prstGeom>
+          <a:noFill/>
+          <a:extLst>
+            <a:ext uri="{909E8E84-426E-40DD-AFC4-6F175D3DCCD1}">
+              <a14:hiddenFill xmlns:a14="http://schemas.microsoft.com/office/drawing/2010/main">
+                <a:solidFill>
+                  <a:srgbClr val="FFFFFF"/>
+                </a:solidFill>
+              </a14:hiddenFill>
+            </a:ext>
+          </a:extLst>
+        </p:spPr>
+      </p:pic>
+      <p:pic>
+        <p:nvPicPr>
+          <p:cNvPr id="9" name="Picture 8"/>
+          <p:cNvPicPr>
+            <a:picLocks noChangeAspect="1"/>
+          </p:cNvPicPr>
+          <p:nvPr/>
+        </p:nvPicPr>
+        <p:blipFill>
+          <a:blip r:embed="rId8"/>
+          <a:stretch>
+            <a:fillRect/>
+          </a:stretch>
+        </p:blipFill>
+        <p:spPr>
+          <a:xfrm>
+            <a:off x="8933194" y="1215384"/>
+            <a:ext cx="3124036" cy="5440362"/>
+          </a:xfrm>
+          <a:prstGeom prst="rect">
+            <a:avLst/>
+          </a:prstGeom>
+        </p:spPr>
+      </p:pic>
+      <p:pic>
+        <p:nvPicPr>
+          <p:cNvPr id="10" name="Picture 10" descr="Image result for hacker"/>
+          <p:cNvPicPr>
+            <a:picLocks noChangeAspect="1" noChangeArrowheads="1"/>
+          </p:cNvPicPr>
+          <p:nvPr/>
+        </p:nvPicPr>
+        <p:blipFill>
+          <a:blip r:embed="rId6">
+            <a:extLst>
+              <a:ext uri="{28A0092B-C50C-407E-A947-70E740481C1C}">
+                <a14:useLocalDpi xmlns:a14="http://schemas.microsoft.com/office/drawing/2010/main" val="0"/>
+              </a:ext>
+            </a:extLst>
+          </a:blip>
+          <a:srcRect/>
+          <a:stretch>
+            <a:fillRect/>
+          </a:stretch>
+        </p:blipFill>
+        <p:spPr bwMode="auto">
+          <a:xfrm>
+            <a:off x="9803188" y="2132621"/>
+            <a:ext cx="1286939" cy="700375"/>
+          </a:xfrm>
+          <a:prstGeom prst="rect">
+            <a:avLst/>
+          </a:prstGeom>
+          <a:noFill/>
+          <a:extLst>
+            <a:ext uri="{909E8E84-426E-40DD-AFC4-6F175D3DCCD1}">
+              <a14:hiddenFill xmlns:a14="http://schemas.microsoft.com/office/drawing/2010/main">
+                <a:solidFill>
+                  <a:srgbClr val="FFFFFF"/>
+                </a:solidFill>
+              </a14:hiddenFill>
+            </a:ext>
+          </a:extLst>
+        </p:spPr>
+      </p:pic>
+      <p:pic>
+        <p:nvPicPr>
+          <p:cNvPr id="11" name="Picture 2" descr="Image result for arrow image"/>
+          <p:cNvPicPr>
+            <a:picLocks noChangeAspect="1" noChangeArrowheads="1"/>
+          </p:cNvPicPr>
+          <p:nvPr/>
+        </p:nvPicPr>
+        <p:blipFill>
+          <a:blip r:embed="rId7">
+            <a:extLst>
+              <a:ext uri="{28A0092B-C50C-407E-A947-70E740481C1C}">
+                <a14:useLocalDpi xmlns:a14="http://schemas.microsoft.com/office/drawing/2010/main" val="0"/>
+              </a:ext>
+            </a:extLst>
+          </a:blip>
+          <a:srcRect/>
+          <a:stretch>
+            <a:fillRect/>
+          </a:stretch>
+        </p:blipFill>
+        <p:spPr bwMode="auto">
+          <a:xfrm>
+            <a:off x="7449227" y="3441177"/>
+            <a:ext cx="995676" cy="624926"/>
+          </a:xfrm>
+          <a:prstGeom prst="rect">
+            <a:avLst/>
+          </a:prstGeom>
+          <a:noFill/>
+          <a:extLst>
+            <a:ext uri="{909E8E84-426E-40DD-AFC4-6F175D3DCCD1}">
+              <a14:hiddenFill xmlns:a14="http://schemas.microsoft.com/office/drawing/2010/main">
+                <a:solidFill>
+                  <a:srgbClr val="FFFFFF"/>
+                </a:solidFill>
+              </a14:hiddenFill>
+            </a:ext>
+          </a:extLst>
+        </p:spPr>
+      </p:pic>
+    </p:spTree>
+    <p:extLst>
+      <p:ext uri="{BB962C8B-B14F-4D97-AF65-F5344CB8AC3E}">
+        <p14:creationId xmlns:p14="http://schemas.microsoft.com/office/powerpoint/2010/main" val="2476109860"/>
+      </p:ext>
+    </p:extLst>
+  </p:cSld>
+  <p:clrMapOvr>
+    <a:masterClrMapping/>
+  </p:clrMapOvr>
+</p:sld>
+</file>
+
+<file path=ppt/slides/slide13.xml><?xml version="1.0" encoding="utf-8"?>
+<p:sld xmlns:a="http://schemas.openxmlformats.org/drawingml/2006/main" xmlns:r="http://schemas.openxmlformats.org/officeDocument/2006/relationships" xmlns:p="http://schemas.openxmlformats.org/presentationml/2006/main">
+  <p:cSld>
+    <p:spTree>
+      <p:nvGrpSpPr>
+        <p:cNvPr id="1" name=""/>
+        <p:cNvGrpSpPr/>
+        <p:nvPr/>
+      </p:nvGrpSpPr>
+      <p:grpSpPr>
+        <a:xfrm>
+          <a:off x="0" y="0"/>
+          <a:ext cx="0" cy="0"/>
+          <a:chOff x="0" y="0"/>
+          <a:chExt cx="0" cy="0"/>
+        </a:xfrm>
+      </p:grpSpPr>
+      <p:sp>
+        <p:nvSpPr>
+          <p:cNvPr id="2" name="Title 1"/>
+          <p:cNvSpPr>
+            <a:spLocks noGrp="1"/>
+          </p:cNvSpPr>
+          <p:nvPr>
+            <p:ph type="title"/>
           </p:nvPr>
         </p:nvSpPr>
         <p:spPr/>
@@ -6048,7 +7792,600 @@
           <a:p>
             <a:r>
               <a:rPr lang="en-US" dirty="0"/>
+              <a:t>Man in the Middle Attack</a:t>
+            </a:r>
+            <a:endParaRPr lang="en-US" dirty="0"/>
+          </a:p>
+        </p:txBody>
+      </p:sp>
+      <p:pic>
+        <p:nvPicPr>
+          <p:cNvPr id="6" name="Content Placeholder 5"/>
+          <p:cNvPicPr>
+            <a:picLocks noGrp="1" noChangeAspect="1"/>
+          </p:cNvPicPr>
+          <p:nvPr>
+            <p:ph idx="1"/>
+          </p:nvPr>
+        </p:nvPicPr>
+        <p:blipFill>
+          <a:blip r:embed="rId2"/>
+          <a:stretch>
+            <a:fillRect/>
+          </a:stretch>
+        </p:blipFill>
+        <p:spPr>
+          <a:xfrm>
+            <a:off x="4678297" y="1400902"/>
+            <a:ext cx="2835403" cy="5113739"/>
+          </a:xfrm>
+          <a:prstGeom prst="rect">
+            <a:avLst/>
+          </a:prstGeom>
+        </p:spPr>
+      </p:pic>
+      <p:pic>
+        <p:nvPicPr>
+          <p:cNvPr id="4" name="Picture 3"/>
+          <p:cNvPicPr>
+            <a:picLocks noChangeAspect="1"/>
+          </p:cNvPicPr>
+          <p:nvPr/>
+        </p:nvPicPr>
+        <p:blipFill>
+          <a:blip r:embed="rId3"/>
+          <a:stretch>
+            <a:fillRect/>
+          </a:stretch>
+        </p:blipFill>
+        <p:spPr>
+          <a:xfrm>
+            <a:off x="0" y="1320361"/>
+            <a:ext cx="3124036" cy="5440362"/>
+          </a:xfrm>
+          <a:prstGeom prst="rect">
+            <a:avLst/>
+          </a:prstGeom>
+        </p:spPr>
+      </p:pic>
+      <p:pic>
+        <p:nvPicPr>
+          <p:cNvPr id="5" name="Picture 10" descr="Image result for hacker"/>
+          <p:cNvPicPr>
+            <a:picLocks noChangeAspect="1" noChangeArrowheads="1"/>
+          </p:cNvPicPr>
+          <p:nvPr/>
+        </p:nvPicPr>
+        <p:blipFill>
+          <a:blip r:embed="rId4">
+            <a:extLst>
+              <a:ext uri="{28A0092B-C50C-407E-A947-70E740481C1C}">
+                <a14:useLocalDpi xmlns:a14="http://schemas.microsoft.com/office/drawing/2010/main" val="0"/>
+              </a:ext>
+            </a:extLst>
+          </a:blip>
+          <a:srcRect/>
+          <a:stretch>
+            <a:fillRect/>
+          </a:stretch>
+        </p:blipFill>
+        <p:spPr bwMode="auto">
+          <a:xfrm>
+            <a:off x="712454" y="2425584"/>
+            <a:ext cx="1286939" cy="700375"/>
+          </a:xfrm>
+          <a:prstGeom prst="rect">
+            <a:avLst/>
+          </a:prstGeom>
+          <a:noFill/>
+          <a:extLst>
+            <a:ext uri="{909E8E84-426E-40DD-AFC4-6F175D3DCCD1}">
+              <a14:hiddenFill xmlns:a14="http://schemas.microsoft.com/office/drawing/2010/main">
+                <a:solidFill>
+                  <a:srgbClr val="FFFFFF"/>
+                </a:solidFill>
+              </a14:hiddenFill>
+            </a:ext>
+          </a:extLst>
+        </p:spPr>
+      </p:pic>
+      <p:pic>
+        <p:nvPicPr>
+          <p:cNvPr id="7" name="Picture 2" descr="Image result for arrow image"/>
+          <p:cNvPicPr>
+            <a:picLocks noChangeAspect="1" noChangeArrowheads="1"/>
+          </p:cNvPicPr>
+          <p:nvPr/>
+        </p:nvPicPr>
+        <p:blipFill>
+          <a:blip r:embed="rId5">
+            <a:extLst>
+              <a:ext uri="{28A0092B-C50C-407E-A947-70E740481C1C}">
+                <a14:useLocalDpi xmlns:a14="http://schemas.microsoft.com/office/drawing/2010/main" val="0"/>
+              </a:ext>
+            </a:extLst>
+          </a:blip>
+          <a:srcRect/>
+          <a:stretch>
+            <a:fillRect/>
+          </a:stretch>
+        </p:blipFill>
+        <p:spPr bwMode="auto">
+          <a:xfrm>
+            <a:off x="3403328" y="3556857"/>
+            <a:ext cx="995676" cy="624926"/>
+          </a:xfrm>
+          <a:prstGeom prst="rect">
+            <a:avLst/>
+          </a:prstGeom>
+          <a:noFill/>
+          <a:extLst>
+            <a:ext uri="{909E8E84-426E-40DD-AFC4-6F175D3DCCD1}">
+              <a14:hiddenFill xmlns:a14="http://schemas.microsoft.com/office/drawing/2010/main">
+                <a:solidFill>
+                  <a:srgbClr val="FFFFFF"/>
+                </a:solidFill>
+              </a14:hiddenFill>
+            </a:ext>
+          </a:extLst>
+        </p:spPr>
+      </p:pic>
+      <p:pic>
+        <p:nvPicPr>
+          <p:cNvPr id="9" name="Picture 2" descr="Image result for arrow image"/>
+          <p:cNvPicPr>
+            <a:picLocks noChangeAspect="1" noChangeArrowheads="1"/>
+          </p:cNvPicPr>
+          <p:nvPr/>
+        </p:nvPicPr>
+        <p:blipFill>
+          <a:blip r:embed="rId5">
+            <a:extLst>
+              <a:ext uri="{28A0092B-C50C-407E-A947-70E740481C1C}">
+                <a14:useLocalDpi xmlns:a14="http://schemas.microsoft.com/office/drawing/2010/main" val="0"/>
+              </a:ext>
+            </a:extLst>
+          </a:blip>
+          <a:srcRect/>
+          <a:stretch>
+            <a:fillRect/>
+          </a:stretch>
+        </p:blipFill>
+        <p:spPr bwMode="auto">
+          <a:xfrm>
+            <a:off x="7719355" y="3593570"/>
+            <a:ext cx="995676" cy="624926"/>
+          </a:xfrm>
+          <a:prstGeom prst="rect">
+            <a:avLst/>
+          </a:prstGeom>
+          <a:noFill/>
+          <a:extLst>
+            <a:ext uri="{909E8E84-426E-40DD-AFC4-6F175D3DCCD1}">
+              <a14:hiddenFill xmlns:a14="http://schemas.microsoft.com/office/drawing/2010/main">
+                <a:solidFill>
+                  <a:srgbClr val="FFFFFF"/>
+                </a:solidFill>
+              </a14:hiddenFill>
+            </a:ext>
+          </a:extLst>
+        </p:spPr>
+      </p:pic>
+      <p:pic>
+        <p:nvPicPr>
+          <p:cNvPr id="10" name="Picture 9"/>
+          <p:cNvPicPr>
+            <a:picLocks noChangeAspect="1"/>
+          </p:cNvPicPr>
+          <p:nvPr/>
+        </p:nvPicPr>
+        <p:blipFill>
+          <a:blip r:embed="rId6"/>
+          <a:stretch>
+            <a:fillRect/>
+          </a:stretch>
+        </p:blipFill>
+        <p:spPr>
+          <a:xfrm>
+            <a:off x="8920686" y="1204574"/>
+            <a:ext cx="3001978" cy="5389173"/>
+          </a:xfrm>
+          <a:prstGeom prst="rect">
+            <a:avLst/>
+          </a:prstGeom>
+        </p:spPr>
+      </p:pic>
+      <p:pic>
+        <p:nvPicPr>
+          <p:cNvPr id="11" name="Picture 8" descr="Image result for B"/>
+          <p:cNvPicPr>
+            <a:picLocks noChangeAspect="1" noChangeArrowheads="1"/>
+          </p:cNvPicPr>
+          <p:nvPr/>
+        </p:nvPicPr>
+        <p:blipFill>
+          <a:blip r:embed="rId7">
+            <a:extLst>
+              <a:ext uri="{28A0092B-C50C-407E-A947-70E740481C1C}">
+                <a14:useLocalDpi xmlns:a14="http://schemas.microsoft.com/office/drawing/2010/main" val="0"/>
+              </a:ext>
+            </a:extLst>
+          </a:blip>
+          <a:srcRect/>
+          <a:stretch>
+            <a:fillRect/>
+          </a:stretch>
+        </p:blipFill>
+        <p:spPr bwMode="auto">
+          <a:xfrm>
+            <a:off x="5476750" y="4218496"/>
+            <a:ext cx="711350" cy="711350"/>
+          </a:xfrm>
+          <a:prstGeom prst="rect">
+            <a:avLst/>
+          </a:prstGeom>
+          <a:noFill/>
+          <a:extLst>
+            <a:ext uri="{909E8E84-426E-40DD-AFC4-6F175D3DCCD1}">
+              <a14:hiddenFill xmlns:a14="http://schemas.microsoft.com/office/drawing/2010/main">
+                <a:solidFill>
+                  <a:srgbClr val="FFFFFF"/>
+                </a:solidFill>
+              </a14:hiddenFill>
+            </a:ext>
+          </a:extLst>
+        </p:spPr>
+      </p:pic>
+      <p:pic>
+        <p:nvPicPr>
+          <p:cNvPr id="12" name="Picture 8" descr="Image result for B"/>
+          <p:cNvPicPr>
+            <a:picLocks noChangeAspect="1" noChangeArrowheads="1"/>
+          </p:cNvPicPr>
+          <p:nvPr/>
+        </p:nvPicPr>
+        <p:blipFill>
+          <a:blip r:embed="rId7">
+            <a:extLst>
+              <a:ext uri="{28A0092B-C50C-407E-A947-70E740481C1C}">
+                <a14:useLocalDpi xmlns:a14="http://schemas.microsoft.com/office/drawing/2010/main" val="0"/>
+              </a:ext>
+            </a:extLst>
+          </a:blip>
+          <a:srcRect/>
+          <a:stretch>
+            <a:fillRect/>
+          </a:stretch>
+        </p:blipFill>
+        <p:spPr bwMode="auto">
+          <a:xfrm>
+            <a:off x="9951095" y="3610464"/>
+            <a:ext cx="711350" cy="711350"/>
+          </a:xfrm>
+          <a:prstGeom prst="rect">
+            <a:avLst/>
+          </a:prstGeom>
+          <a:noFill/>
+          <a:extLst>
+            <a:ext uri="{909E8E84-426E-40DD-AFC4-6F175D3DCCD1}">
+              <a14:hiddenFill xmlns:a14="http://schemas.microsoft.com/office/drawing/2010/main">
+                <a:solidFill>
+                  <a:srgbClr val="FFFFFF"/>
+                </a:solidFill>
+              </a14:hiddenFill>
+            </a:ext>
+          </a:extLst>
+        </p:spPr>
+      </p:pic>
+    </p:spTree>
+    <p:extLst>
+      <p:ext uri="{BB962C8B-B14F-4D97-AF65-F5344CB8AC3E}">
+        <p14:creationId xmlns:p14="http://schemas.microsoft.com/office/powerpoint/2010/main" val="1523341300"/>
+      </p:ext>
+    </p:extLst>
+  </p:cSld>
+  <p:clrMapOvr>
+    <a:masterClrMapping/>
+  </p:clrMapOvr>
+</p:sld>
+</file>
+
+<file path=ppt/slides/slide14.xml><?xml version="1.0" encoding="utf-8"?>
+<p:sld xmlns:a="http://schemas.openxmlformats.org/drawingml/2006/main" xmlns:r="http://schemas.openxmlformats.org/officeDocument/2006/relationships" xmlns:p="http://schemas.openxmlformats.org/presentationml/2006/main">
+  <p:cSld>
+    <p:spTree>
+      <p:nvGrpSpPr>
+        <p:cNvPr id="1" name=""/>
+        <p:cNvGrpSpPr/>
+        <p:nvPr/>
+      </p:nvGrpSpPr>
+      <p:grpSpPr>
+        <a:xfrm>
+          <a:off x="0" y="0"/>
+          <a:ext cx="0" cy="0"/>
+          <a:chOff x="0" y="0"/>
+          <a:chExt cx="0" cy="0"/>
+        </a:xfrm>
+      </p:grpSpPr>
+      <p:sp>
+        <p:nvSpPr>
+          <p:cNvPr id="2" name="Title 1"/>
+          <p:cNvSpPr>
+            <a:spLocks noGrp="1"/>
+          </p:cNvSpPr>
+          <p:nvPr>
+            <p:ph type="title"/>
+          </p:nvPr>
+        </p:nvSpPr>
+        <p:spPr/>
+        <p:txBody>
+          <a:bodyPr/>
+          <a:lstStyle/>
+          <a:p>
+            <a:r>
+              <a:rPr lang="en-US" dirty="0"/>
+              <a:t>Source Code Algorithm</a:t>
+            </a:r>
+          </a:p>
+        </p:txBody>
+      </p:sp>
+      <p:pic>
+        <p:nvPicPr>
+          <p:cNvPr id="6" name="Content Placeholder 5"/>
+          <p:cNvPicPr>
+            <a:picLocks noGrp="1" noChangeAspect="1"/>
+          </p:cNvPicPr>
+          <p:nvPr>
+            <p:ph idx="1"/>
+          </p:nvPr>
+        </p:nvPicPr>
+        <p:blipFill>
+          <a:blip r:embed="rId3"/>
+          <a:stretch>
+            <a:fillRect/>
+          </a:stretch>
+        </p:blipFill>
+        <p:spPr>
+          <a:xfrm>
+            <a:off x="6250768" y="2056443"/>
+            <a:ext cx="5941232" cy="3636963"/>
+          </a:xfrm>
+          <a:prstGeom prst="rect">
+            <a:avLst/>
+          </a:prstGeom>
+        </p:spPr>
+      </p:pic>
+      <p:pic>
+        <p:nvPicPr>
+          <p:cNvPr id="4" name="Picture 3"/>
+          <p:cNvPicPr>
+            <a:picLocks noChangeAspect="1"/>
+          </p:cNvPicPr>
+          <p:nvPr/>
+        </p:nvPicPr>
+        <p:blipFill>
+          <a:blip r:embed="rId4"/>
+          <a:stretch>
+            <a:fillRect/>
+          </a:stretch>
+        </p:blipFill>
+        <p:spPr>
+          <a:xfrm>
+            <a:off x="671887" y="2341096"/>
+            <a:ext cx="4648200" cy="2238375"/>
+          </a:xfrm>
+          <a:prstGeom prst="rect">
+            <a:avLst/>
+          </a:prstGeom>
+        </p:spPr>
+      </p:pic>
+      <p:pic>
+        <p:nvPicPr>
+          <p:cNvPr id="5" name="Picture 4"/>
+          <p:cNvPicPr>
+            <a:picLocks noChangeAspect="1"/>
+          </p:cNvPicPr>
+          <p:nvPr/>
+        </p:nvPicPr>
+        <p:blipFill>
+          <a:blip r:embed="rId5"/>
+          <a:stretch>
+            <a:fillRect/>
+          </a:stretch>
+        </p:blipFill>
+        <p:spPr>
+          <a:xfrm>
+            <a:off x="810000" y="1645771"/>
+            <a:ext cx="4371975" cy="695325"/>
+          </a:xfrm>
+          <a:prstGeom prst="rect">
+            <a:avLst/>
+          </a:prstGeom>
+        </p:spPr>
+      </p:pic>
+      <p:pic>
+        <p:nvPicPr>
+          <p:cNvPr id="7" name="Picture 6"/>
+          <p:cNvPicPr>
+            <a:picLocks noChangeAspect="1"/>
+          </p:cNvPicPr>
+          <p:nvPr/>
+        </p:nvPicPr>
+        <p:blipFill>
+          <a:blip r:embed="rId6"/>
+          <a:stretch>
+            <a:fillRect/>
+          </a:stretch>
+        </p:blipFill>
+        <p:spPr>
+          <a:xfrm>
+            <a:off x="200395" y="4598521"/>
+            <a:ext cx="5772150" cy="1352550"/>
+          </a:xfrm>
+          <a:prstGeom prst="rect">
+            <a:avLst/>
+          </a:prstGeom>
+        </p:spPr>
+      </p:pic>
+    </p:spTree>
+    <p:extLst>
+      <p:ext uri="{BB962C8B-B14F-4D97-AF65-F5344CB8AC3E}">
+        <p14:creationId xmlns:p14="http://schemas.microsoft.com/office/powerpoint/2010/main" val="26907234"/>
+      </p:ext>
+    </p:extLst>
+  </p:cSld>
+  <p:clrMapOvr>
+    <a:masterClrMapping/>
+  </p:clrMapOvr>
+</p:sld>
+</file>
+
+<file path=ppt/slides/slide15.xml><?xml version="1.0" encoding="utf-8"?>
+<p:sld xmlns:a="http://schemas.openxmlformats.org/drawingml/2006/main" xmlns:r="http://schemas.openxmlformats.org/officeDocument/2006/relationships" xmlns:p="http://schemas.openxmlformats.org/presentationml/2006/main">
+  <p:cSld>
+    <p:spTree>
+      <p:nvGrpSpPr>
+        <p:cNvPr id="1" name=""/>
+        <p:cNvGrpSpPr/>
+        <p:nvPr/>
+      </p:nvGrpSpPr>
+      <p:grpSpPr>
+        <a:xfrm>
+          <a:off x="0" y="0"/>
+          <a:ext cx="0" cy="0"/>
+          <a:chOff x="0" y="0"/>
+          <a:chExt cx="0" cy="0"/>
+        </a:xfrm>
+      </p:grpSpPr>
+      <p:sp>
+        <p:nvSpPr>
+          <p:cNvPr id="2" name="Title 1"/>
+          <p:cNvSpPr>
+            <a:spLocks noGrp="1"/>
+          </p:cNvSpPr>
+          <p:nvPr>
+            <p:ph type="title"/>
+          </p:nvPr>
+        </p:nvSpPr>
+        <p:spPr/>
+        <p:txBody>
+          <a:bodyPr/>
+          <a:lstStyle/>
+          <a:p>
+            <a:r>
+              <a:rPr lang="en-US" dirty="0"/>
+              <a:t>Questions?</a:t>
+            </a:r>
+          </a:p>
+        </p:txBody>
+      </p:sp>
+      <p:sp>
+        <p:nvSpPr>
+          <p:cNvPr id="3" name="Content Placeholder 2"/>
+          <p:cNvSpPr>
+            <a:spLocks noGrp="1"/>
+          </p:cNvSpPr>
+          <p:nvPr>
+            <p:ph idx="1"/>
+          </p:nvPr>
+        </p:nvSpPr>
+        <p:spPr/>
+        <p:txBody>
+          <a:bodyPr/>
+          <a:lstStyle/>
+          <a:p>
+            <a:endParaRPr lang="en-US"/>
+          </a:p>
+        </p:txBody>
+      </p:sp>
+    </p:spTree>
+    <p:extLst>
+      <p:ext uri="{BB962C8B-B14F-4D97-AF65-F5344CB8AC3E}">
+        <p14:creationId xmlns:p14="http://schemas.microsoft.com/office/powerpoint/2010/main" val="1289061755"/>
+      </p:ext>
+    </p:extLst>
+  </p:cSld>
+  <p:clrMapOvr>
+    <a:masterClrMapping/>
+  </p:clrMapOvr>
+</p:sld>
+</file>
+
+<file path=ppt/slides/slide16.xml><?xml version="1.0" encoding="utf-8"?>
+<p:sld xmlns:a="http://schemas.openxmlformats.org/drawingml/2006/main" xmlns:r="http://schemas.openxmlformats.org/officeDocument/2006/relationships" xmlns:p="http://schemas.openxmlformats.org/presentationml/2006/main">
+  <p:cSld>
+    <p:spTree>
+      <p:nvGrpSpPr>
+        <p:cNvPr id="1" name=""/>
+        <p:cNvGrpSpPr/>
+        <p:nvPr/>
+      </p:nvGrpSpPr>
+      <p:grpSpPr>
+        <a:xfrm>
+          <a:off x="0" y="0"/>
+          <a:ext cx="0" cy="0"/>
+          <a:chOff x="0" y="0"/>
+          <a:chExt cx="0" cy="0"/>
+        </a:xfrm>
+      </p:grpSpPr>
+      <p:sp>
+        <p:nvSpPr>
+          <p:cNvPr id="2" name="Title 1"/>
+          <p:cNvSpPr>
+            <a:spLocks noGrp="1"/>
+          </p:cNvSpPr>
+          <p:nvPr>
+            <p:ph type="title"/>
+          </p:nvPr>
+        </p:nvSpPr>
+        <p:spPr/>
+        <p:txBody>
+          <a:bodyPr/>
+          <a:lstStyle/>
+          <a:p>
+            <a:r>
+              <a:rPr lang="en-US" dirty="0"/>
+              <a:t>References</a:t>
+            </a:r>
+          </a:p>
+        </p:txBody>
+      </p:sp>
+      <p:sp>
+        <p:nvSpPr>
+          <p:cNvPr id="3" name="Content Placeholder 2"/>
+          <p:cNvSpPr>
+            <a:spLocks noGrp="1"/>
+          </p:cNvSpPr>
+          <p:nvPr>
+            <p:ph idx="1"/>
+          </p:nvPr>
+        </p:nvSpPr>
+        <p:spPr/>
+        <p:txBody>
+          <a:bodyPr/>
+          <a:lstStyle/>
+          <a:p>
+            <a:r>
+              <a:rPr lang="en-US" dirty="0">
+                <a:hlinkClick r:id="rId2"/>
+              </a:rPr>
               <a:t>http://www.garykessler.net/library/crypto.html</a:t>
+            </a:r>
+            <a:endParaRPr lang="en-US" dirty="0"/>
+          </a:p>
+          <a:p>
+            <a:r>
+              <a:rPr lang="en-US" dirty="0">
+                <a:hlinkClick r:id="rId3"/>
+              </a:rPr>
+              <a:t>https://www.deepdotweb.com/wp-content/uploads/2016/10/word-image-19.png</a:t>
+            </a:r>
+            <a:endParaRPr lang="en-US" dirty="0"/>
+          </a:p>
+          <a:p>
+            <a:r>
+              <a:rPr lang="en-US" dirty="0"/>
+              <a:t>https://www.gohacking.com/wp-content/uploads/2009/01/how-to-become-a-hacker-735x400.jpg</a:t>
             </a:r>
             <a:endParaRPr lang="en-US" dirty="0"/>
           </a:p>
@@ -6201,6 +8538,477 @@
   <p:clrMapOvr>
     <a:masterClrMapping/>
   </p:clrMapOvr>
+  <p:timing>
+    <p:tnLst>
+      <p:par>
+        <p:cTn id="1" dur="indefinite" restart="never" nodeType="tmRoot">
+          <p:childTnLst>
+            <p:seq concurrent="1" nextAc="seek">
+              <p:cTn id="2" dur="indefinite" nodeType="mainSeq">
+                <p:childTnLst>
+                  <p:par>
+                    <p:cTn id="3" fill="hold">
+                      <p:stCondLst>
+                        <p:cond delay="indefinite"/>
+                      </p:stCondLst>
+                      <p:childTnLst>
+                        <p:par>
+                          <p:cTn id="4" fill="hold">
+                            <p:stCondLst>
+                              <p:cond delay="0"/>
+                            </p:stCondLst>
+                            <p:childTnLst>
+                              <p:par>
+                                <p:cTn id="5" presetID="10" presetClass="entr" presetSubtype="0" fill="hold" nodeType="clickEffect">
+                                  <p:stCondLst>
+                                    <p:cond delay="0"/>
+                                  </p:stCondLst>
+                                  <p:childTnLst>
+                                    <p:set>
+                                      <p:cBhvr>
+                                        <p:cTn id="6" dur="1" fill="hold">
+                                          <p:stCondLst>
+                                            <p:cond delay="0"/>
+                                          </p:stCondLst>
+                                        </p:cTn>
+                                        <p:tgtEl>
+                                          <p:spTgt spid="3">
+                                            <p:txEl>
+                                              <p:pRg st="1" end="1"/>
+                                            </p:txEl>
+                                          </p:spTgt>
+                                        </p:tgtEl>
+                                        <p:attrNameLst>
+                                          <p:attrName>style.visibility</p:attrName>
+                                        </p:attrNameLst>
+                                      </p:cBhvr>
+                                      <p:to>
+                                        <p:strVal val="visible"/>
+                                      </p:to>
+                                    </p:set>
+                                    <p:animEffect transition="in" filter="fade">
+                                      <p:cBhvr>
+                                        <p:cTn id="7" dur="500"/>
+                                        <p:tgtEl>
+                                          <p:spTgt spid="3">
+                                            <p:txEl>
+                                              <p:pRg st="1" end="1"/>
+                                            </p:txEl>
+                                          </p:spTgt>
+                                        </p:tgtEl>
+                                      </p:cBhvr>
+                                    </p:animEffect>
+                                  </p:childTnLst>
+                                </p:cTn>
+                              </p:par>
+                              <p:par>
+                                <p:cTn id="8" presetID="10" presetClass="entr" presetSubtype="0" fill="hold" nodeType="withEffect">
+                                  <p:stCondLst>
+                                    <p:cond delay="0"/>
+                                  </p:stCondLst>
+                                  <p:childTnLst>
+                                    <p:set>
+                                      <p:cBhvr>
+                                        <p:cTn id="9" dur="1" fill="hold">
+                                          <p:stCondLst>
+                                            <p:cond delay="0"/>
+                                          </p:stCondLst>
+                                        </p:cTn>
+                                        <p:tgtEl>
+                                          <p:spTgt spid="3">
+                                            <p:txEl>
+                                              <p:pRg st="2" end="2"/>
+                                            </p:txEl>
+                                          </p:spTgt>
+                                        </p:tgtEl>
+                                        <p:attrNameLst>
+                                          <p:attrName>style.visibility</p:attrName>
+                                        </p:attrNameLst>
+                                      </p:cBhvr>
+                                      <p:to>
+                                        <p:strVal val="visible"/>
+                                      </p:to>
+                                    </p:set>
+                                    <p:animEffect transition="in" filter="fade">
+                                      <p:cBhvr>
+                                        <p:cTn id="10" dur="500"/>
+                                        <p:tgtEl>
+                                          <p:spTgt spid="3">
+                                            <p:txEl>
+                                              <p:pRg st="2" end="2"/>
+                                            </p:txEl>
+                                          </p:spTgt>
+                                        </p:tgtEl>
+                                      </p:cBhvr>
+                                    </p:animEffect>
+                                  </p:childTnLst>
+                                </p:cTn>
+                              </p:par>
+                              <p:par>
+                                <p:cTn id="11" presetID="10" presetClass="entr" presetSubtype="0" fill="hold" nodeType="withEffect">
+                                  <p:stCondLst>
+                                    <p:cond delay="0"/>
+                                  </p:stCondLst>
+                                  <p:childTnLst>
+                                    <p:set>
+                                      <p:cBhvr>
+                                        <p:cTn id="12" dur="1" fill="hold">
+                                          <p:stCondLst>
+                                            <p:cond delay="0"/>
+                                          </p:stCondLst>
+                                        </p:cTn>
+                                        <p:tgtEl>
+                                          <p:spTgt spid="3">
+                                            <p:txEl>
+                                              <p:pRg st="3" end="3"/>
+                                            </p:txEl>
+                                          </p:spTgt>
+                                        </p:tgtEl>
+                                        <p:attrNameLst>
+                                          <p:attrName>style.visibility</p:attrName>
+                                        </p:attrNameLst>
+                                      </p:cBhvr>
+                                      <p:to>
+                                        <p:strVal val="visible"/>
+                                      </p:to>
+                                    </p:set>
+                                    <p:animEffect transition="in" filter="fade">
+                                      <p:cBhvr>
+                                        <p:cTn id="13" dur="500"/>
+                                        <p:tgtEl>
+                                          <p:spTgt spid="3">
+                                            <p:txEl>
+                                              <p:pRg st="3" end="3"/>
+                                            </p:txEl>
+                                          </p:spTgt>
+                                        </p:tgtEl>
+                                      </p:cBhvr>
+                                    </p:animEffect>
+                                  </p:childTnLst>
+                                </p:cTn>
+                              </p:par>
+                            </p:childTnLst>
+                          </p:cTn>
+                        </p:par>
+                      </p:childTnLst>
+                    </p:cTn>
+                  </p:par>
+                  <p:par>
+                    <p:cTn id="14" fill="hold">
+                      <p:stCondLst>
+                        <p:cond delay="indefinite"/>
+                      </p:stCondLst>
+                      <p:childTnLst>
+                        <p:par>
+                          <p:cTn id="15" fill="hold">
+                            <p:stCondLst>
+                              <p:cond delay="0"/>
+                            </p:stCondLst>
+                            <p:childTnLst>
+                              <p:par>
+                                <p:cTn id="16" presetID="10" presetClass="entr" presetSubtype="0" fill="hold" nodeType="clickEffect">
+                                  <p:stCondLst>
+                                    <p:cond delay="0"/>
+                                  </p:stCondLst>
+                                  <p:childTnLst>
+                                    <p:set>
+                                      <p:cBhvr>
+                                        <p:cTn id="17" dur="1" fill="hold">
+                                          <p:stCondLst>
+                                            <p:cond delay="0"/>
+                                          </p:stCondLst>
+                                        </p:cTn>
+                                        <p:tgtEl>
+                                          <p:spTgt spid="3">
+                                            <p:txEl>
+                                              <p:pRg st="4" end="4"/>
+                                            </p:txEl>
+                                          </p:spTgt>
+                                        </p:tgtEl>
+                                        <p:attrNameLst>
+                                          <p:attrName>style.visibility</p:attrName>
+                                        </p:attrNameLst>
+                                      </p:cBhvr>
+                                      <p:to>
+                                        <p:strVal val="visible"/>
+                                      </p:to>
+                                    </p:set>
+                                    <p:animEffect transition="in" filter="fade">
+                                      <p:cBhvr>
+                                        <p:cTn id="18" dur="500"/>
+                                        <p:tgtEl>
+                                          <p:spTgt spid="3">
+                                            <p:txEl>
+                                              <p:pRg st="4" end="4"/>
+                                            </p:txEl>
+                                          </p:spTgt>
+                                        </p:tgtEl>
+                                      </p:cBhvr>
+                                    </p:animEffect>
+                                  </p:childTnLst>
+                                </p:cTn>
+                              </p:par>
+                              <p:par>
+                                <p:cTn id="19" presetID="10" presetClass="entr" presetSubtype="0" fill="hold" nodeType="withEffect">
+                                  <p:stCondLst>
+                                    <p:cond delay="0"/>
+                                  </p:stCondLst>
+                                  <p:childTnLst>
+                                    <p:set>
+                                      <p:cBhvr>
+                                        <p:cTn id="20" dur="1" fill="hold">
+                                          <p:stCondLst>
+                                            <p:cond delay="0"/>
+                                          </p:stCondLst>
+                                        </p:cTn>
+                                        <p:tgtEl>
+                                          <p:spTgt spid="3">
+                                            <p:txEl>
+                                              <p:pRg st="5" end="5"/>
+                                            </p:txEl>
+                                          </p:spTgt>
+                                        </p:tgtEl>
+                                        <p:attrNameLst>
+                                          <p:attrName>style.visibility</p:attrName>
+                                        </p:attrNameLst>
+                                      </p:cBhvr>
+                                      <p:to>
+                                        <p:strVal val="visible"/>
+                                      </p:to>
+                                    </p:set>
+                                    <p:animEffect transition="in" filter="fade">
+                                      <p:cBhvr>
+                                        <p:cTn id="21" dur="500"/>
+                                        <p:tgtEl>
+                                          <p:spTgt spid="3">
+                                            <p:txEl>
+                                              <p:pRg st="5" end="5"/>
+                                            </p:txEl>
+                                          </p:spTgt>
+                                        </p:tgtEl>
+                                      </p:cBhvr>
+                                    </p:animEffect>
+                                  </p:childTnLst>
+                                </p:cTn>
+                              </p:par>
+                              <p:par>
+                                <p:cTn id="22" presetID="10" presetClass="entr" presetSubtype="0" fill="hold" nodeType="withEffect">
+                                  <p:stCondLst>
+                                    <p:cond delay="0"/>
+                                  </p:stCondLst>
+                                  <p:childTnLst>
+                                    <p:set>
+                                      <p:cBhvr>
+                                        <p:cTn id="23" dur="1" fill="hold">
+                                          <p:stCondLst>
+                                            <p:cond delay="0"/>
+                                          </p:stCondLst>
+                                        </p:cTn>
+                                        <p:tgtEl>
+                                          <p:spTgt spid="3">
+                                            <p:txEl>
+                                              <p:pRg st="6" end="6"/>
+                                            </p:txEl>
+                                          </p:spTgt>
+                                        </p:tgtEl>
+                                        <p:attrNameLst>
+                                          <p:attrName>style.visibility</p:attrName>
+                                        </p:attrNameLst>
+                                      </p:cBhvr>
+                                      <p:to>
+                                        <p:strVal val="visible"/>
+                                      </p:to>
+                                    </p:set>
+                                    <p:animEffect transition="in" filter="fade">
+                                      <p:cBhvr>
+                                        <p:cTn id="24" dur="500"/>
+                                        <p:tgtEl>
+                                          <p:spTgt spid="3">
+                                            <p:txEl>
+                                              <p:pRg st="6" end="6"/>
+                                            </p:txEl>
+                                          </p:spTgt>
+                                        </p:tgtEl>
+                                      </p:cBhvr>
+                                    </p:animEffect>
+                                  </p:childTnLst>
+                                </p:cTn>
+                              </p:par>
+                            </p:childTnLst>
+                          </p:cTn>
+                        </p:par>
+                      </p:childTnLst>
+                    </p:cTn>
+                  </p:par>
+                  <p:par>
+                    <p:cTn id="25" fill="hold">
+                      <p:stCondLst>
+                        <p:cond delay="indefinite"/>
+                      </p:stCondLst>
+                      <p:childTnLst>
+                        <p:par>
+                          <p:cTn id="26" fill="hold">
+                            <p:stCondLst>
+                              <p:cond delay="0"/>
+                            </p:stCondLst>
+                            <p:childTnLst>
+                              <p:par>
+                                <p:cTn id="27" presetID="10" presetClass="entr" presetSubtype="0" fill="hold" nodeType="clickEffect">
+                                  <p:stCondLst>
+                                    <p:cond delay="0"/>
+                                  </p:stCondLst>
+                                  <p:childTnLst>
+                                    <p:set>
+                                      <p:cBhvr>
+                                        <p:cTn id="28" dur="1" fill="hold">
+                                          <p:stCondLst>
+                                            <p:cond delay="0"/>
+                                          </p:stCondLst>
+                                        </p:cTn>
+                                        <p:tgtEl>
+                                          <p:spTgt spid="3">
+                                            <p:txEl>
+                                              <p:pRg st="7" end="7"/>
+                                            </p:txEl>
+                                          </p:spTgt>
+                                        </p:tgtEl>
+                                        <p:attrNameLst>
+                                          <p:attrName>style.visibility</p:attrName>
+                                        </p:attrNameLst>
+                                      </p:cBhvr>
+                                      <p:to>
+                                        <p:strVal val="visible"/>
+                                      </p:to>
+                                    </p:set>
+                                    <p:animEffect transition="in" filter="fade">
+                                      <p:cBhvr>
+                                        <p:cTn id="29" dur="500"/>
+                                        <p:tgtEl>
+                                          <p:spTgt spid="3">
+                                            <p:txEl>
+                                              <p:pRg st="7" end="7"/>
+                                            </p:txEl>
+                                          </p:spTgt>
+                                        </p:tgtEl>
+                                      </p:cBhvr>
+                                    </p:animEffect>
+                                  </p:childTnLst>
+                                </p:cTn>
+                              </p:par>
+                              <p:par>
+                                <p:cTn id="30" presetID="10" presetClass="entr" presetSubtype="0" fill="hold" nodeType="withEffect">
+                                  <p:stCondLst>
+                                    <p:cond delay="0"/>
+                                  </p:stCondLst>
+                                  <p:childTnLst>
+                                    <p:set>
+                                      <p:cBhvr>
+                                        <p:cTn id="31" dur="1" fill="hold">
+                                          <p:stCondLst>
+                                            <p:cond delay="0"/>
+                                          </p:stCondLst>
+                                        </p:cTn>
+                                        <p:tgtEl>
+                                          <p:spTgt spid="3">
+                                            <p:txEl>
+                                              <p:pRg st="8" end="8"/>
+                                            </p:txEl>
+                                          </p:spTgt>
+                                        </p:tgtEl>
+                                        <p:attrNameLst>
+                                          <p:attrName>style.visibility</p:attrName>
+                                        </p:attrNameLst>
+                                      </p:cBhvr>
+                                      <p:to>
+                                        <p:strVal val="visible"/>
+                                      </p:to>
+                                    </p:set>
+                                    <p:animEffect transition="in" filter="fade">
+                                      <p:cBhvr>
+                                        <p:cTn id="32" dur="500"/>
+                                        <p:tgtEl>
+                                          <p:spTgt spid="3">
+                                            <p:txEl>
+                                              <p:pRg st="8" end="8"/>
+                                            </p:txEl>
+                                          </p:spTgt>
+                                        </p:tgtEl>
+                                      </p:cBhvr>
+                                    </p:animEffect>
+                                  </p:childTnLst>
+                                </p:cTn>
+                              </p:par>
+                              <p:par>
+                                <p:cTn id="33" presetID="10" presetClass="entr" presetSubtype="0" fill="hold" nodeType="withEffect">
+                                  <p:stCondLst>
+                                    <p:cond delay="0"/>
+                                  </p:stCondLst>
+                                  <p:childTnLst>
+                                    <p:set>
+                                      <p:cBhvr>
+                                        <p:cTn id="34" dur="1" fill="hold">
+                                          <p:stCondLst>
+                                            <p:cond delay="0"/>
+                                          </p:stCondLst>
+                                        </p:cTn>
+                                        <p:tgtEl>
+                                          <p:spTgt spid="3">
+                                            <p:txEl>
+                                              <p:pRg st="9" end="9"/>
+                                            </p:txEl>
+                                          </p:spTgt>
+                                        </p:tgtEl>
+                                        <p:attrNameLst>
+                                          <p:attrName>style.visibility</p:attrName>
+                                        </p:attrNameLst>
+                                      </p:cBhvr>
+                                      <p:to>
+                                        <p:strVal val="visible"/>
+                                      </p:to>
+                                    </p:set>
+                                    <p:animEffect transition="in" filter="fade">
+                                      <p:cBhvr>
+                                        <p:cTn id="35" dur="500"/>
+                                        <p:tgtEl>
+                                          <p:spTgt spid="3">
+                                            <p:txEl>
+                                              <p:pRg st="9" end="9"/>
+                                            </p:txEl>
+                                          </p:spTgt>
+                                        </p:tgtEl>
+                                      </p:cBhvr>
+                                    </p:animEffect>
+                                  </p:childTnLst>
+                                </p:cTn>
+                              </p:par>
+                            </p:childTnLst>
+                          </p:cTn>
+                        </p:par>
+                      </p:childTnLst>
+                    </p:cTn>
+                  </p:par>
+                </p:childTnLst>
+              </p:cTn>
+              <p:prevCondLst>
+                <p:cond evt="onPrev" delay="0">
+                  <p:tgtEl>
+                    <p:sldTgt/>
+                  </p:tgtEl>
+                </p:cond>
+              </p:prevCondLst>
+              <p:nextCondLst>
+                <p:cond evt="onNext" delay="0">
+                  <p:tgtEl>
+                    <p:sldTgt/>
+                  </p:tgtEl>
+                </p:cond>
+              </p:nextCondLst>
+            </p:seq>
+          </p:childTnLst>
+        </p:cTn>
+      </p:par>
+    </p:tnLst>
+  </p:timing>
 </p:sld>
 </file>
 
@@ -6342,6 +9150,477 @@
   <p:clrMapOvr>
     <a:masterClrMapping/>
   </p:clrMapOvr>
+  <p:timing>
+    <p:tnLst>
+      <p:par>
+        <p:cTn id="1" dur="indefinite" restart="never" nodeType="tmRoot">
+          <p:childTnLst>
+            <p:seq concurrent="1" nextAc="seek">
+              <p:cTn id="2" dur="indefinite" nodeType="mainSeq">
+                <p:childTnLst>
+                  <p:par>
+                    <p:cTn id="3" fill="hold">
+                      <p:stCondLst>
+                        <p:cond delay="indefinite"/>
+                      </p:stCondLst>
+                      <p:childTnLst>
+                        <p:par>
+                          <p:cTn id="4" fill="hold">
+                            <p:stCondLst>
+                              <p:cond delay="0"/>
+                            </p:stCondLst>
+                            <p:childTnLst>
+                              <p:par>
+                                <p:cTn id="5" presetID="10" presetClass="entr" presetSubtype="0" fill="hold" nodeType="clickEffect">
+                                  <p:stCondLst>
+                                    <p:cond delay="0"/>
+                                  </p:stCondLst>
+                                  <p:childTnLst>
+                                    <p:set>
+                                      <p:cBhvr>
+                                        <p:cTn id="6" dur="1" fill="hold">
+                                          <p:stCondLst>
+                                            <p:cond delay="0"/>
+                                          </p:stCondLst>
+                                        </p:cTn>
+                                        <p:tgtEl>
+                                          <p:spTgt spid="3">
+                                            <p:txEl>
+                                              <p:pRg st="1" end="1"/>
+                                            </p:txEl>
+                                          </p:spTgt>
+                                        </p:tgtEl>
+                                        <p:attrNameLst>
+                                          <p:attrName>style.visibility</p:attrName>
+                                        </p:attrNameLst>
+                                      </p:cBhvr>
+                                      <p:to>
+                                        <p:strVal val="visible"/>
+                                      </p:to>
+                                    </p:set>
+                                    <p:animEffect transition="in" filter="fade">
+                                      <p:cBhvr>
+                                        <p:cTn id="7" dur="500"/>
+                                        <p:tgtEl>
+                                          <p:spTgt spid="3">
+                                            <p:txEl>
+                                              <p:pRg st="1" end="1"/>
+                                            </p:txEl>
+                                          </p:spTgt>
+                                        </p:tgtEl>
+                                      </p:cBhvr>
+                                    </p:animEffect>
+                                  </p:childTnLst>
+                                </p:cTn>
+                              </p:par>
+                              <p:par>
+                                <p:cTn id="8" presetID="10" presetClass="entr" presetSubtype="0" fill="hold" nodeType="withEffect">
+                                  <p:stCondLst>
+                                    <p:cond delay="0"/>
+                                  </p:stCondLst>
+                                  <p:childTnLst>
+                                    <p:set>
+                                      <p:cBhvr>
+                                        <p:cTn id="9" dur="1" fill="hold">
+                                          <p:stCondLst>
+                                            <p:cond delay="0"/>
+                                          </p:stCondLst>
+                                        </p:cTn>
+                                        <p:tgtEl>
+                                          <p:spTgt spid="3">
+                                            <p:txEl>
+                                              <p:pRg st="2" end="2"/>
+                                            </p:txEl>
+                                          </p:spTgt>
+                                        </p:tgtEl>
+                                        <p:attrNameLst>
+                                          <p:attrName>style.visibility</p:attrName>
+                                        </p:attrNameLst>
+                                      </p:cBhvr>
+                                      <p:to>
+                                        <p:strVal val="visible"/>
+                                      </p:to>
+                                    </p:set>
+                                    <p:animEffect transition="in" filter="fade">
+                                      <p:cBhvr>
+                                        <p:cTn id="10" dur="500"/>
+                                        <p:tgtEl>
+                                          <p:spTgt spid="3">
+                                            <p:txEl>
+                                              <p:pRg st="2" end="2"/>
+                                            </p:txEl>
+                                          </p:spTgt>
+                                        </p:tgtEl>
+                                      </p:cBhvr>
+                                    </p:animEffect>
+                                  </p:childTnLst>
+                                </p:cTn>
+                              </p:par>
+                              <p:par>
+                                <p:cTn id="11" presetID="10" presetClass="entr" presetSubtype="0" fill="hold" nodeType="withEffect">
+                                  <p:stCondLst>
+                                    <p:cond delay="0"/>
+                                  </p:stCondLst>
+                                  <p:childTnLst>
+                                    <p:set>
+                                      <p:cBhvr>
+                                        <p:cTn id="12" dur="1" fill="hold">
+                                          <p:stCondLst>
+                                            <p:cond delay="0"/>
+                                          </p:stCondLst>
+                                        </p:cTn>
+                                        <p:tgtEl>
+                                          <p:spTgt spid="3">
+                                            <p:txEl>
+                                              <p:pRg st="3" end="3"/>
+                                            </p:txEl>
+                                          </p:spTgt>
+                                        </p:tgtEl>
+                                        <p:attrNameLst>
+                                          <p:attrName>style.visibility</p:attrName>
+                                        </p:attrNameLst>
+                                      </p:cBhvr>
+                                      <p:to>
+                                        <p:strVal val="visible"/>
+                                      </p:to>
+                                    </p:set>
+                                    <p:animEffect transition="in" filter="fade">
+                                      <p:cBhvr>
+                                        <p:cTn id="13" dur="500"/>
+                                        <p:tgtEl>
+                                          <p:spTgt spid="3">
+                                            <p:txEl>
+                                              <p:pRg st="3" end="3"/>
+                                            </p:txEl>
+                                          </p:spTgt>
+                                        </p:tgtEl>
+                                      </p:cBhvr>
+                                    </p:animEffect>
+                                  </p:childTnLst>
+                                </p:cTn>
+                              </p:par>
+                            </p:childTnLst>
+                          </p:cTn>
+                        </p:par>
+                      </p:childTnLst>
+                    </p:cTn>
+                  </p:par>
+                  <p:par>
+                    <p:cTn id="14" fill="hold">
+                      <p:stCondLst>
+                        <p:cond delay="indefinite"/>
+                      </p:stCondLst>
+                      <p:childTnLst>
+                        <p:par>
+                          <p:cTn id="15" fill="hold">
+                            <p:stCondLst>
+                              <p:cond delay="0"/>
+                            </p:stCondLst>
+                            <p:childTnLst>
+                              <p:par>
+                                <p:cTn id="16" presetID="10" presetClass="entr" presetSubtype="0" fill="hold" nodeType="clickEffect">
+                                  <p:stCondLst>
+                                    <p:cond delay="0"/>
+                                  </p:stCondLst>
+                                  <p:childTnLst>
+                                    <p:set>
+                                      <p:cBhvr>
+                                        <p:cTn id="17" dur="1" fill="hold">
+                                          <p:stCondLst>
+                                            <p:cond delay="0"/>
+                                          </p:stCondLst>
+                                        </p:cTn>
+                                        <p:tgtEl>
+                                          <p:spTgt spid="3">
+                                            <p:txEl>
+                                              <p:pRg st="4" end="4"/>
+                                            </p:txEl>
+                                          </p:spTgt>
+                                        </p:tgtEl>
+                                        <p:attrNameLst>
+                                          <p:attrName>style.visibility</p:attrName>
+                                        </p:attrNameLst>
+                                      </p:cBhvr>
+                                      <p:to>
+                                        <p:strVal val="visible"/>
+                                      </p:to>
+                                    </p:set>
+                                    <p:animEffect transition="in" filter="fade">
+                                      <p:cBhvr>
+                                        <p:cTn id="18" dur="500"/>
+                                        <p:tgtEl>
+                                          <p:spTgt spid="3">
+                                            <p:txEl>
+                                              <p:pRg st="4" end="4"/>
+                                            </p:txEl>
+                                          </p:spTgt>
+                                        </p:tgtEl>
+                                      </p:cBhvr>
+                                    </p:animEffect>
+                                  </p:childTnLst>
+                                </p:cTn>
+                              </p:par>
+                              <p:par>
+                                <p:cTn id="19" presetID="10" presetClass="entr" presetSubtype="0" fill="hold" nodeType="withEffect">
+                                  <p:stCondLst>
+                                    <p:cond delay="0"/>
+                                  </p:stCondLst>
+                                  <p:childTnLst>
+                                    <p:set>
+                                      <p:cBhvr>
+                                        <p:cTn id="20" dur="1" fill="hold">
+                                          <p:stCondLst>
+                                            <p:cond delay="0"/>
+                                          </p:stCondLst>
+                                        </p:cTn>
+                                        <p:tgtEl>
+                                          <p:spTgt spid="3">
+                                            <p:txEl>
+                                              <p:pRg st="5" end="5"/>
+                                            </p:txEl>
+                                          </p:spTgt>
+                                        </p:tgtEl>
+                                        <p:attrNameLst>
+                                          <p:attrName>style.visibility</p:attrName>
+                                        </p:attrNameLst>
+                                      </p:cBhvr>
+                                      <p:to>
+                                        <p:strVal val="visible"/>
+                                      </p:to>
+                                    </p:set>
+                                    <p:animEffect transition="in" filter="fade">
+                                      <p:cBhvr>
+                                        <p:cTn id="21" dur="500"/>
+                                        <p:tgtEl>
+                                          <p:spTgt spid="3">
+                                            <p:txEl>
+                                              <p:pRg st="5" end="5"/>
+                                            </p:txEl>
+                                          </p:spTgt>
+                                        </p:tgtEl>
+                                      </p:cBhvr>
+                                    </p:animEffect>
+                                  </p:childTnLst>
+                                </p:cTn>
+                              </p:par>
+                              <p:par>
+                                <p:cTn id="22" presetID="10" presetClass="entr" presetSubtype="0" fill="hold" nodeType="withEffect">
+                                  <p:stCondLst>
+                                    <p:cond delay="0"/>
+                                  </p:stCondLst>
+                                  <p:childTnLst>
+                                    <p:set>
+                                      <p:cBhvr>
+                                        <p:cTn id="23" dur="1" fill="hold">
+                                          <p:stCondLst>
+                                            <p:cond delay="0"/>
+                                          </p:stCondLst>
+                                        </p:cTn>
+                                        <p:tgtEl>
+                                          <p:spTgt spid="3">
+                                            <p:txEl>
+                                              <p:pRg st="6" end="6"/>
+                                            </p:txEl>
+                                          </p:spTgt>
+                                        </p:tgtEl>
+                                        <p:attrNameLst>
+                                          <p:attrName>style.visibility</p:attrName>
+                                        </p:attrNameLst>
+                                      </p:cBhvr>
+                                      <p:to>
+                                        <p:strVal val="visible"/>
+                                      </p:to>
+                                    </p:set>
+                                    <p:animEffect transition="in" filter="fade">
+                                      <p:cBhvr>
+                                        <p:cTn id="24" dur="500"/>
+                                        <p:tgtEl>
+                                          <p:spTgt spid="3">
+                                            <p:txEl>
+                                              <p:pRg st="6" end="6"/>
+                                            </p:txEl>
+                                          </p:spTgt>
+                                        </p:tgtEl>
+                                      </p:cBhvr>
+                                    </p:animEffect>
+                                  </p:childTnLst>
+                                </p:cTn>
+                              </p:par>
+                            </p:childTnLst>
+                          </p:cTn>
+                        </p:par>
+                      </p:childTnLst>
+                    </p:cTn>
+                  </p:par>
+                  <p:par>
+                    <p:cTn id="25" fill="hold">
+                      <p:stCondLst>
+                        <p:cond delay="indefinite"/>
+                      </p:stCondLst>
+                      <p:childTnLst>
+                        <p:par>
+                          <p:cTn id="26" fill="hold">
+                            <p:stCondLst>
+                              <p:cond delay="0"/>
+                            </p:stCondLst>
+                            <p:childTnLst>
+                              <p:par>
+                                <p:cTn id="27" presetID="10" presetClass="entr" presetSubtype="0" fill="hold" nodeType="clickEffect">
+                                  <p:stCondLst>
+                                    <p:cond delay="0"/>
+                                  </p:stCondLst>
+                                  <p:childTnLst>
+                                    <p:set>
+                                      <p:cBhvr>
+                                        <p:cTn id="28" dur="1" fill="hold">
+                                          <p:stCondLst>
+                                            <p:cond delay="0"/>
+                                          </p:stCondLst>
+                                        </p:cTn>
+                                        <p:tgtEl>
+                                          <p:spTgt spid="3">
+                                            <p:txEl>
+                                              <p:pRg st="7" end="7"/>
+                                            </p:txEl>
+                                          </p:spTgt>
+                                        </p:tgtEl>
+                                        <p:attrNameLst>
+                                          <p:attrName>style.visibility</p:attrName>
+                                        </p:attrNameLst>
+                                      </p:cBhvr>
+                                      <p:to>
+                                        <p:strVal val="visible"/>
+                                      </p:to>
+                                    </p:set>
+                                    <p:animEffect transition="in" filter="fade">
+                                      <p:cBhvr>
+                                        <p:cTn id="29" dur="500"/>
+                                        <p:tgtEl>
+                                          <p:spTgt spid="3">
+                                            <p:txEl>
+                                              <p:pRg st="7" end="7"/>
+                                            </p:txEl>
+                                          </p:spTgt>
+                                        </p:tgtEl>
+                                      </p:cBhvr>
+                                    </p:animEffect>
+                                  </p:childTnLst>
+                                </p:cTn>
+                              </p:par>
+                              <p:par>
+                                <p:cTn id="30" presetID="10" presetClass="entr" presetSubtype="0" fill="hold" nodeType="withEffect">
+                                  <p:stCondLst>
+                                    <p:cond delay="0"/>
+                                  </p:stCondLst>
+                                  <p:childTnLst>
+                                    <p:set>
+                                      <p:cBhvr>
+                                        <p:cTn id="31" dur="1" fill="hold">
+                                          <p:stCondLst>
+                                            <p:cond delay="0"/>
+                                          </p:stCondLst>
+                                        </p:cTn>
+                                        <p:tgtEl>
+                                          <p:spTgt spid="3">
+                                            <p:txEl>
+                                              <p:pRg st="8" end="8"/>
+                                            </p:txEl>
+                                          </p:spTgt>
+                                        </p:tgtEl>
+                                        <p:attrNameLst>
+                                          <p:attrName>style.visibility</p:attrName>
+                                        </p:attrNameLst>
+                                      </p:cBhvr>
+                                      <p:to>
+                                        <p:strVal val="visible"/>
+                                      </p:to>
+                                    </p:set>
+                                    <p:animEffect transition="in" filter="fade">
+                                      <p:cBhvr>
+                                        <p:cTn id="32" dur="500"/>
+                                        <p:tgtEl>
+                                          <p:spTgt spid="3">
+                                            <p:txEl>
+                                              <p:pRg st="8" end="8"/>
+                                            </p:txEl>
+                                          </p:spTgt>
+                                        </p:tgtEl>
+                                      </p:cBhvr>
+                                    </p:animEffect>
+                                  </p:childTnLst>
+                                </p:cTn>
+                              </p:par>
+                              <p:par>
+                                <p:cTn id="33" presetID="10" presetClass="entr" presetSubtype="0" fill="hold" nodeType="withEffect">
+                                  <p:stCondLst>
+                                    <p:cond delay="0"/>
+                                  </p:stCondLst>
+                                  <p:childTnLst>
+                                    <p:set>
+                                      <p:cBhvr>
+                                        <p:cTn id="34" dur="1" fill="hold">
+                                          <p:stCondLst>
+                                            <p:cond delay="0"/>
+                                          </p:stCondLst>
+                                        </p:cTn>
+                                        <p:tgtEl>
+                                          <p:spTgt spid="3">
+                                            <p:txEl>
+                                              <p:pRg st="9" end="9"/>
+                                            </p:txEl>
+                                          </p:spTgt>
+                                        </p:tgtEl>
+                                        <p:attrNameLst>
+                                          <p:attrName>style.visibility</p:attrName>
+                                        </p:attrNameLst>
+                                      </p:cBhvr>
+                                      <p:to>
+                                        <p:strVal val="visible"/>
+                                      </p:to>
+                                    </p:set>
+                                    <p:animEffect transition="in" filter="fade">
+                                      <p:cBhvr>
+                                        <p:cTn id="35" dur="500"/>
+                                        <p:tgtEl>
+                                          <p:spTgt spid="3">
+                                            <p:txEl>
+                                              <p:pRg st="9" end="9"/>
+                                            </p:txEl>
+                                          </p:spTgt>
+                                        </p:tgtEl>
+                                      </p:cBhvr>
+                                    </p:animEffect>
+                                  </p:childTnLst>
+                                </p:cTn>
+                              </p:par>
+                            </p:childTnLst>
+                          </p:cTn>
+                        </p:par>
+                      </p:childTnLst>
+                    </p:cTn>
+                  </p:par>
+                </p:childTnLst>
+              </p:cTn>
+              <p:prevCondLst>
+                <p:cond evt="onPrev" delay="0">
+                  <p:tgtEl>
+                    <p:sldTgt/>
+                  </p:tgtEl>
+                </p:cond>
+              </p:prevCondLst>
+              <p:nextCondLst>
+                <p:cond evt="onNext" delay="0">
+                  <p:tgtEl>
+                    <p:sldTgt/>
+                  </p:tgtEl>
+                </p:cond>
+              </p:nextCondLst>
+            </p:seq>
+          </p:childTnLst>
+        </p:cTn>
+      </p:par>
+    </p:tnLst>
+  </p:timing>
 </p:sld>
 </file>
 
@@ -6427,7 +9706,7 @@
           <p:nvPr/>
         </p:nvPicPr>
         <p:blipFill>
-          <a:blip r:embed="rId2">
+          <a:blip r:embed="rId3">
             <a:extLst>
               <a:ext uri="{28A0092B-C50C-407E-A947-70E740481C1C}">
                 <a14:useLocalDpi xmlns:a14="http://schemas.microsoft.com/office/drawing/2010/main" val="0"/>
@@ -6539,14 +9818,14 @@
           <p:nvPr/>
         </p:nvPicPr>
         <p:blipFill>
-          <a:blip r:embed="rId2"/>
+          <a:blip r:embed="rId3"/>
           <a:stretch>
             <a:fillRect/>
           </a:stretch>
         </p:blipFill>
         <p:spPr>
           <a:xfrm>
-            <a:off x="2986481" y="1511988"/>
+            <a:off x="1760208" y="1367536"/>
             <a:ext cx="8671582" cy="5346011"/>
           </a:xfrm>
           <a:prstGeom prst="rect">
@@ -6634,14 +9913,14 @@
           <p:nvPr/>
         </p:nvPicPr>
         <p:blipFill>
-          <a:blip r:embed="rId2"/>
+          <a:blip r:embed="rId3"/>
           <a:stretch>
             <a:fillRect/>
           </a:stretch>
         </p:blipFill>
         <p:spPr>
           <a:xfrm>
-            <a:off x="2537369" y="1618539"/>
+            <a:off x="1969199" y="1584397"/>
             <a:ext cx="2607660" cy="4912290"/>
           </a:xfrm>
           <a:prstGeom prst="rect">
@@ -6658,7 +9937,7 @@
           <p:nvPr/>
         </p:nvPicPr>
         <p:blipFill>
-          <a:blip r:embed="rId3"/>
+          <a:blip r:embed="rId4"/>
           <a:stretch>
             <a:fillRect/>
           </a:stretch>
@@ -6722,7 +10001,6 @@
               <a:rPr lang="en-US" dirty="0"/>
               <a:t>Experiments</a:t>
             </a:r>
-            <a:endParaRPr lang="en-US" dirty="0"/>
           </a:p>
         </p:txBody>
       </p:sp>
@@ -6754,7 +10032,7 @@
           <p:nvPr/>
         </p:nvPicPr>
         <p:blipFill>
-          <a:blip r:embed="rId2"/>
+          <a:blip r:embed="rId3"/>
           <a:stretch>
             <a:fillRect/>
           </a:stretch>
@@ -6818,7 +10096,6 @@
               <a:rPr lang="en-US" dirty="0"/>
               <a:t>Experiments</a:t>
             </a:r>
-            <a:endParaRPr lang="en-US" dirty="0"/>
           </a:p>
         </p:txBody>
       </p:sp>
@@ -6857,7 +10134,7 @@
         </p:blipFill>
         <p:spPr>
           <a:xfrm>
-            <a:off x="3648723" y="1568499"/>
+            <a:off x="2183907" y="1560028"/>
             <a:ext cx="7464833" cy="4961028"/>
           </a:xfrm>
           <a:prstGeom prst="rect">
@@ -6914,7 +10191,6 @@
               <a:rPr lang="en-US" dirty="0"/>
               <a:t>Experiments</a:t>
             </a:r>
-            <a:endParaRPr lang="en-US" dirty="0"/>
           </a:p>
         </p:txBody>
       </p:sp>
@@ -6946,7 +10222,7 @@
           <p:nvPr/>
         </p:nvPicPr>
         <p:blipFill>
-          <a:blip r:embed="rId2"/>
+          <a:blip r:embed="rId3"/>
           <a:stretch>
             <a:fillRect/>
           </a:stretch>

</xml_diff>